<commit_message>
Large update with new implementations of tf_idf.
</commit_message>
<xml_diff>
--- a/Installation_SetUp.pptx
+++ b/Installation_SetUp.pptx
@@ -6,14 +6,15 @@
   </p:sldMasterIdLst>
   <p:sldIdLst>
     <p:sldId id="262" r:id="rId2"/>
-    <p:sldId id="256" r:id="rId3"/>
-    <p:sldId id="257" r:id="rId4"/>
-    <p:sldId id="258" r:id="rId5"/>
-    <p:sldId id="259" r:id="rId6"/>
-    <p:sldId id="260" r:id="rId7"/>
-    <p:sldId id="263" r:id="rId8"/>
-    <p:sldId id="264" r:id="rId9"/>
-    <p:sldId id="261" r:id="rId10"/>
+    <p:sldId id="266" r:id="rId3"/>
+    <p:sldId id="256" r:id="rId4"/>
+    <p:sldId id="257" r:id="rId5"/>
+    <p:sldId id="258" r:id="rId6"/>
+    <p:sldId id="259" r:id="rId7"/>
+    <p:sldId id="260" r:id="rId8"/>
+    <p:sldId id="263" r:id="rId9"/>
+    <p:sldId id="264" r:id="rId10"/>
+    <p:sldId id="265" r:id="rId11"/>
   </p:sldIdLst>
   <p:sldSz cx="12192000" cy="6858000"/>
   <p:notesSz cx="6858000" cy="9144000"/>
@@ -269,7 +270,7 @@
           <a:p>
             <a:fld id="{610DDAEC-E297-D640-BC92-FB8587CD2ACE}" type="datetimeFigureOut">
               <a:rPr lang="en-CH" smtClean="0"/>
-              <a:t>10.06.2024</a:t>
+              <a:t>13.06.2024</a:t>
             </a:fld>
             <a:endParaRPr lang="en-CH"/>
           </a:p>
@@ -469,7 +470,7 @@
           <a:p>
             <a:fld id="{610DDAEC-E297-D640-BC92-FB8587CD2ACE}" type="datetimeFigureOut">
               <a:rPr lang="en-CH" smtClean="0"/>
-              <a:t>10.06.2024</a:t>
+              <a:t>13.06.2024</a:t>
             </a:fld>
             <a:endParaRPr lang="en-CH"/>
           </a:p>
@@ -679,7 +680,7 @@
           <a:p>
             <a:fld id="{610DDAEC-E297-D640-BC92-FB8587CD2ACE}" type="datetimeFigureOut">
               <a:rPr lang="en-CH" smtClean="0"/>
-              <a:t>10.06.2024</a:t>
+              <a:t>13.06.2024</a:t>
             </a:fld>
             <a:endParaRPr lang="en-CH"/>
           </a:p>
@@ -879,7 +880,7 @@
           <a:p>
             <a:fld id="{610DDAEC-E297-D640-BC92-FB8587CD2ACE}" type="datetimeFigureOut">
               <a:rPr lang="en-CH" smtClean="0"/>
-              <a:t>10.06.2024</a:t>
+              <a:t>13.06.2024</a:t>
             </a:fld>
             <a:endParaRPr lang="en-CH"/>
           </a:p>
@@ -1155,7 +1156,7 @@
           <a:p>
             <a:fld id="{610DDAEC-E297-D640-BC92-FB8587CD2ACE}" type="datetimeFigureOut">
               <a:rPr lang="en-CH" smtClean="0"/>
-              <a:t>10.06.2024</a:t>
+              <a:t>13.06.2024</a:t>
             </a:fld>
             <a:endParaRPr lang="en-CH"/>
           </a:p>
@@ -1423,7 +1424,7 @@
           <a:p>
             <a:fld id="{610DDAEC-E297-D640-BC92-FB8587CD2ACE}" type="datetimeFigureOut">
               <a:rPr lang="en-CH" smtClean="0"/>
-              <a:t>10.06.2024</a:t>
+              <a:t>13.06.2024</a:t>
             </a:fld>
             <a:endParaRPr lang="en-CH"/>
           </a:p>
@@ -1838,7 +1839,7 @@
           <a:p>
             <a:fld id="{610DDAEC-E297-D640-BC92-FB8587CD2ACE}" type="datetimeFigureOut">
               <a:rPr lang="en-CH" smtClean="0"/>
-              <a:t>10.06.2024</a:t>
+              <a:t>13.06.2024</a:t>
             </a:fld>
             <a:endParaRPr lang="en-CH"/>
           </a:p>
@@ -1980,7 +1981,7 @@
           <a:p>
             <a:fld id="{610DDAEC-E297-D640-BC92-FB8587CD2ACE}" type="datetimeFigureOut">
               <a:rPr lang="en-CH" smtClean="0"/>
-              <a:t>10.06.2024</a:t>
+              <a:t>13.06.2024</a:t>
             </a:fld>
             <a:endParaRPr lang="en-CH"/>
           </a:p>
@@ -2093,7 +2094,7 @@
           <a:p>
             <a:fld id="{610DDAEC-E297-D640-BC92-FB8587CD2ACE}" type="datetimeFigureOut">
               <a:rPr lang="en-CH" smtClean="0"/>
-              <a:t>10.06.2024</a:t>
+              <a:t>13.06.2024</a:t>
             </a:fld>
             <a:endParaRPr lang="en-CH"/>
           </a:p>
@@ -2406,7 +2407,7 @@
           <a:p>
             <a:fld id="{610DDAEC-E297-D640-BC92-FB8587CD2ACE}" type="datetimeFigureOut">
               <a:rPr lang="en-CH" smtClean="0"/>
-              <a:t>10.06.2024</a:t>
+              <a:t>13.06.2024</a:t>
             </a:fld>
             <a:endParaRPr lang="en-CH"/>
           </a:p>
@@ -2695,7 +2696,7 @@
           <a:p>
             <a:fld id="{610DDAEC-E297-D640-BC92-FB8587CD2ACE}" type="datetimeFigureOut">
               <a:rPr lang="en-CH" smtClean="0"/>
-              <a:t>10.06.2024</a:t>
+              <a:t>13.06.2024</a:t>
             </a:fld>
             <a:endParaRPr lang="en-CH"/>
           </a:p>
@@ -2938,7 +2939,7 @@
           <a:p>
             <a:fld id="{610DDAEC-E297-D640-BC92-FB8587CD2ACE}" type="datetimeFigureOut">
               <a:rPr lang="en-CH" smtClean="0"/>
-              <a:t>10.06.2024</a:t>
+              <a:t>13.06.2024</a:t>
             </a:fld>
             <a:endParaRPr lang="en-CH"/>
           </a:p>
@@ -3357,10 +3358,10 @@
       </p:grpSpPr>
       <p:sp>
         <p:nvSpPr>
-          <p:cNvPr id="4" name="TextBox 3">
-            <a:extLst>
-              <a:ext uri="{FF2B5EF4-FFF2-40B4-BE49-F238E27FC236}">
-                <a16:creationId xmlns:a16="http://schemas.microsoft.com/office/drawing/2014/main" id="{F6C99D8C-3ACF-F066-E630-6DDBD48A7B01}"/>
+          <p:cNvPr id="2" name="TextBox 1">
+            <a:extLst>
+              <a:ext uri="{FF2B5EF4-FFF2-40B4-BE49-F238E27FC236}">
+                <a16:creationId xmlns:a16="http://schemas.microsoft.com/office/drawing/2014/main" id="{1646E52D-1CDA-1F51-7382-9765F9B0D127}"/>
               </a:ext>
             </a:extLst>
           </p:cNvPr>
@@ -3369,14 +3370,175 @@
         </p:nvSpPr>
         <p:spPr>
           <a:xfrm>
-            <a:off x="370114" y="2767280"/>
-            <a:ext cx="11451771" cy="1323439"/>
+            <a:off x="370111" y="258673"/>
+            <a:ext cx="11451771" cy="2785378"/>
           </a:xfrm>
           <a:prstGeom prst="rect">
             <a:avLst/>
           </a:prstGeom>
           <a:solidFill>
-            <a:schemeClr val="accent1">
+            <a:schemeClr val="bg1">
+              <a:lumMod val="85000"/>
+            </a:schemeClr>
+          </a:solidFill>
+        </p:spPr>
+        <p:txBody>
+          <a:bodyPr wrap="square" rtlCol="0">
+            <a:spAutoFit/>
+          </a:bodyPr>
+          <a:lstStyle/>
+          <a:p>
+            <a:pPr algn="ctr"/>
+            <a:r>
+              <a:rPr lang="en-CH" sz="2500" u="sng" dirty="0">
+                <a:latin typeface="Arial" panose="020B0604020202020204" pitchFamily="34" charset="0"/>
+                <a:cs typeface="Arial" panose="020B0604020202020204" pitchFamily="34" charset="0"/>
+              </a:rPr>
+              <a:t>Projektbeschreibung</a:t>
+            </a:r>
+            <a:endParaRPr lang="en-CH" sz="2500" dirty="0">
+              <a:latin typeface="Arial" panose="020B0604020202020204" pitchFamily="34" charset="0"/>
+              <a:cs typeface="Arial" panose="020B0604020202020204" pitchFamily="34" charset="0"/>
+            </a:endParaRPr>
+          </a:p>
+          <a:p>
+            <a:pPr algn="ctr"/>
+            <a:endParaRPr lang="en-CH" sz="2500" dirty="0">
+              <a:latin typeface="Arial" panose="020B0604020202020204" pitchFamily="34" charset="0"/>
+              <a:cs typeface="Arial" panose="020B0604020202020204" pitchFamily="34" charset="0"/>
+            </a:endParaRPr>
+          </a:p>
+          <a:p>
+            <a:r>
+              <a:rPr lang="en-CH" sz="2500" dirty="0">
+                <a:latin typeface="Arial" panose="020B0604020202020204" pitchFamily="34" charset="0"/>
+                <a:cs typeface="Arial" panose="020B0604020202020204" pitchFamily="34" charset="0"/>
+              </a:rPr>
+              <a:t>- Part 1: Erstellung vom eigenen Inf. </a:t>
+            </a:r>
+            <a:r>
+              <a:rPr lang="en-GB" sz="2500" dirty="0">
+                <a:latin typeface="Arial" panose="020B0604020202020204" pitchFamily="34" charset="0"/>
+                <a:cs typeface="Arial" panose="020B0604020202020204" pitchFamily="34" charset="0"/>
+              </a:rPr>
+              <a:t>R</a:t>
+            </a:r>
+            <a:r>
+              <a:rPr lang="en-CH" sz="2500" dirty="0">
+                <a:latin typeface="Arial" panose="020B0604020202020204" pitchFamily="34" charset="0"/>
+                <a:cs typeface="Arial" panose="020B0604020202020204" pitchFamily="34" charset="0"/>
+              </a:rPr>
+              <a:t>etrieval System</a:t>
+            </a:r>
+          </a:p>
+          <a:p>
+            <a:r>
+              <a:rPr lang="en-CH" sz="2500" dirty="0">
+                <a:latin typeface="Arial" panose="020B0604020202020204" pitchFamily="34" charset="0"/>
+                <a:cs typeface="Arial" panose="020B0604020202020204" pitchFamily="34" charset="0"/>
+              </a:rPr>
+              <a:t>- Part 2: Vergleich mit PyS</a:t>
+            </a:r>
+            <a:r>
+              <a:rPr lang="en-GB" sz="2500" dirty="0">
+                <a:latin typeface="Arial" panose="020B0604020202020204" pitchFamily="34" charset="0"/>
+                <a:cs typeface="Arial" panose="020B0604020202020204" pitchFamily="34" charset="0"/>
+              </a:rPr>
+              <a:t>o</a:t>
+            </a:r>
+            <a:r>
+              <a:rPr lang="en-CH" sz="2500" dirty="0">
+                <a:latin typeface="Arial" panose="020B0604020202020204" pitchFamily="34" charset="0"/>
+                <a:cs typeface="Arial" panose="020B0604020202020204" pitchFamily="34" charset="0"/>
+              </a:rPr>
+              <a:t>lar</a:t>
+            </a:r>
+          </a:p>
+          <a:p>
+            <a:r>
+              <a:rPr lang="en-CH" sz="2500" dirty="0">
+                <a:latin typeface="Arial" panose="020B0604020202020204" pitchFamily="34" charset="0"/>
+                <a:cs typeface="Arial" panose="020B0604020202020204" pitchFamily="34" charset="0"/>
+              </a:rPr>
+              <a:t>- Part 3: GUI, das erlaubt, zwischen die zwei Systeme (Eigenes/PySolar) zu </a:t>
+            </a:r>
+            <a:br>
+              <a:rPr lang="en-CH" sz="2500" dirty="0">
+                <a:latin typeface="Arial" panose="020B0604020202020204" pitchFamily="34" charset="0"/>
+                <a:cs typeface="Arial" panose="020B0604020202020204" pitchFamily="34" charset="0"/>
+              </a:rPr>
+            </a:br>
+            <a:r>
+              <a:rPr lang="en-CH" sz="2500" dirty="0">
+                <a:latin typeface="Arial" panose="020B0604020202020204" pitchFamily="34" charset="0"/>
+                <a:cs typeface="Arial" panose="020B0604020202020204" pitchFamily="34" charset="0"/>
+              </a:rPr>
+              <a:t>              wechseln.</a:t>
+            </a:r>
+          </a:p>
+          <a:p>
+            <a:r>
+              <a:rPr lang="en-CH" sz="2500" dirty="0">
+                <a:latin typeface="Arial" panose="020B0604020202020204" pitchFamily="34" charset="0"/>
+                <a:cs typeface="Arial" panose="020B0604020202020204" pitchFamily="34" charset="0"/>
+              </a:rPr>
+              <a:t>- Part 4: Zusätzliche Vergleiche von Querries mit PyLucene </a:t>
+            </a:r>
+          </a:p>
+        </p:txBody>
+      </p:sp>
+    </p:spTree>
+    <p:extLst>
+      <p:ext uri="{BB962C8B-B14F-4D97-AF65-F5344CB8AC3E}">
+        <p14:creationId xmlns:p14="http://schemas.microsoft.com/office/powerpoint/2010/main" val="3515892943"/>
+      </p:ext>
+    </p:extLst>
+  </p:cSld>
+  <p:clrMapOvr>
+    <a:masterClrMapping/>
+  </p:clrMapOvr>
+</p:sld>
+</file>
+
+<file path=ppt/slides/slide10.xml><?xml version="1.0" encoding="utf-8"?>
+<p:sld xmlns:a="http://schemas.openxmlformats.org/drawingml/2006/main" xmlns:r="http://schemas.openxmlformats.org/officeDocument/2006/relationships" xmlns:p="http://schemas.openxmlformats.org/presentationml/2006/main">
+  <p:cSld>
+    <p:spTree>
+      <p:nvGrpSpPr>
+        <p:cNvPr id="1" name=""/>
+        <p:cNvGrpSpPr/>
+        <p:nvPr/>
+      </p:nvGrpSpPr>
+      <p:grpSpPr>
+        <a:xfrm>
+          <a:off x="0" y="0"/>
+          <a:ext cx="0" cy="0"/>
+          <a:chOff x="0" y="0"/>
+          <a:chExt cx="0" cy="0"/>
+        </a:xfrm>
+      </p:grpSpPr>
+      <p:sp>
+        <p:nvSpPr>
+          <p:cNvPr id="3" name="TextBox 2">
+            <a:extLst>
+              <a:ext uri="{FF2B5EF4-FFF2-40B4-BE49-F238E27FC236}">
+                <a16:creationId xmlns:a16="http://schemas.microsoft.com/office/drawing/2014/main" id="{771DEB4A-B95F-8F1E-FBBF-8C69A484B6CC}"/>
+              </a:ext>
+            </a:extLst>
+          </p:cNvPr>
+          <p:cNvSpPr txBox="1"/>
+          <p:nvPr/>
+        </p:nvSpPr>
+        <p:spPr>
+          <a:xfrm>
+            <a:off x="370111" y="258673"/>
+            <a:ext cx="11451771" cy="1246495"/>
+          </a:xfrm>
+          <a:prstGeom prst="rect">
+            <a:avLst/>
+          </a:prstGeom>
+          <a:solidFill>
+            <a:schemeClr val="accent6">
               <a:lumMod val="40000"/>
               <a:lumOff val="60000"/>
             </a:schemeClr>
@@ -3390,29 +3552,208 @@
           <a:p>
             <a:pPr algn="ctr"/>
             <a:r>
-              <a:rPr lang="en-CH" sz="4000" dirty="0">
-                <a:latin typeface="Arial" panose="020B0604020202020204" pitchFamily="34" charset="0"/>
-                <a:cs typeface="Arial" panose="020B0604020202020204" pitchFamily="34" charset="0"/>
-              </a:rPr>
-              <a:t>Install packages under</a:t>
+              <a:rPr lang="en-CH" sz="2500" u="sng" dirty="0">
+                <a:latin typeface="Arial" panose="020B0604020202020204" pitchFamily="34" charset="0"/>
+                <a:cs typeface="Arial" panose="020B0604020202020204" pitchFamily="34" charset="0"/>
+              </a:rPr>
+              <a:t>Preparation steps for</a:t>
+            </a:r>
+            <a:r>
+              <a:rPr lang="en-CH" sz="2500" dirty="0">
+                <a:latin typeface="Arial" panose="020B0604020202020204" pitchFamily="34" charset="0"/>
+                <a:cs typeface="Arial" panose="020B0604020202020204" pitchFamily="34" charset="0"/>
+              </a:rPr>
+              <a:t>:</a:t>
             </a:r>
           </a:p>
           <a:p>
             <a:pPr algn="ctr"/>
-            <a:r>
-              <a:rPr lang="en-CH" sz="4000" dirty="0">
-                <a:latin typeface="Arial" panose="020B0604020202020204" pitchFamily="34" charset="0"/>
-                <a:cs typeface="Arial" panose="020B0604020202020204" pitchFamily="34" charset="0"/>
-              </a:rPr>
-              <a:t> virtual environment</a:t>
-            </a:r>
-          </a:p>
-        </p:txBody>
-      </p:sp>
+            <a:endParaRPr lang="en-CH" sz="2500" dirty="0">
+              <a:latin typeface="Arial" panose="020B0604020202020204" pitchFamily="34" charset="0"/>
+              <a:cs typeface="Arial" panose="020B0604020202020204" pitchFamily="34" charset="0"/>
+            </a:endParaRPr>
+          </a:p>
+          <a:p>
+            <a:r>
+              <a:rPr lang="en-CH" sz="2500" dirty="0">
+                <a:latin typeface="Arial" panose="020B0604020202020204" pitchFamily="34" charset="0"/>
+                <a:cs typeface="Arial" panose="020B0604020202020204" pitchFamily="34" charset="0"/>
+              </a:rPr>
+              <a:t>- Part 3: Comparison with PyLucene</a:t>
+            </a:r>
+          </a:p>
+        </p:txBody>
+      </p:sp>
+      <p:sp>
+        <p:nvSpPr>
+          <p:cNvPr id="4" name="TextBox 3">
+            <a:extLst>
+              <a:ext uri="{FF2B5EF4-FFF2-40B4-BE49-F238E27FC236}">
+                <a16:creationId xmlns:a16="http://schemas.microsoft.com/office/drawing/2014/main" id="{DABAC1C6-98CF-BDD1-142A-F01311CF4BBB}"/>
+              </a:ext>
+            </a:extLst>
+          </p:cNvPr>
+          <p:cNvSpPr txBox="1"/>
+          <p:nvPr/>
+        </p:nvSpPr>
+        <p:spPr>
+          <a:xfrm>
+            <a:off x="370111" y="1674810"/>
+            <a:ext cx="11451771" cy="646331"/>
+          </a:xfrm>
+          <a:prstGeom prst="rect">
+            <a:avLst/>
+          </a:prstGeom>
+          <a:noFill/>
+        </p:spPr>
+        <p:txBody>
+          <a:bodyPr wrap="square" rtlCol="0">
+            <a:spAutoFit/>
+          </a:bodyPr>
+          <a:lstStyle/>
+          <a:p>
+            <a:pPr marL="342900" indent="-342900">
+              <a:buFont typeface="Arial" panose="020B0604020202020204" pitchFamily="34" charset="0"/>
+              <a:buChar char="•"/>
+            </a:pPr>
+            <a:r>
+              <a:rPr lang="en-CH" dirty="0">
+                <a:latin typeface="Arial" panose="020B0604020202020204" pitchFamily="34" charset="0"/>
+                <a:cs typeface="Arial" panose="020B0604020202020204" pitchFamily="34" charset="0"/>
+              </a:rPr>
+              <a:t>PyLucene interpreter erstellen:</a:t>
+            </a:r>
+            <a:br>
+              <a:rPr lang="en-CH" dirty="0">
+                <a:latin typeface="Arial" panose="020B0604020202020204" pitchFamily="34" charset="0"/>
+                <a:cs typeface="Arial" panose="020B0604020202020204" pitchFamily="34" charset="0"/>
+              </a:rPr>
+            </a:br>
+            <a:r>
+              <a:rPr lang="en-CH" dirty="0">
+                <a:latin typeface="Arial" panose="020B0604020202020204" pitchFamily="34" charset="0"/>
+                <a:cs typeface="Arial" panose="020B0604020202020204" pitchFamily="34" charset="0"/>
+              </a:rPr>
+              <a:t>PyCharm &lt; Eistellungen &lt; Python Interpreter</a:t>
+            </a:r>
+          </a:p>
+        </p:txBody>
+      </p:sp>
+      <p:pic>
+        <p:nvPicPr>
+          <p:cNvPr id="5" name="Picture 4">
+            <a:extLst>
+              <a:ext uri="{FF2B5EF4-FFF2-40B4-BE49-F238E27FC236}">
+                <a16:creationId xmlns:a16="http://schemas.microsoft.com/office/drawing/2014/main" id="{DB55C8EC-B755-D320-4348-1AD05BD40D08}"/>
+              </a:ext>
+            </a:extLst>
+          </p:cNvPr>
+          <p:cNvPicPr>
+            <a:picLocks noChangeAspect="1"/>
+          </p:cNvPicPr>
+          <p:nvPr/>
+        </p:nvPicPr>
+        <p:blipFill>
+          <a:blip r:embed="rId2"/>
+          <a:srcRect/>
+          <a:stretch/>
+        </p:blipFill>
+        <p:spPr>
+          <a:xfrm>
+            <a:off x="811869" y="2402438"/>
+            <a:ext cx="7176406" cy="1750342"/>
+          </a:xfrm>
+          <a:prstGeom prst="rect">
+            <a:avLst/>
+          </a:prstGeom>
+        </p:spPr>
+      </p:pic>
+      <p:sp>
+        <p:nvSpPr>
+          <p:cNvPr id="6" name="Oval 5">
+            <a:extLst>
+              <a:ext uri="{FF2B5EF4-FFF2-40B4-BE49-F238E27FC236}">
+                <a16:creationId xmlns:a16="http://schemas.microsoft.com/office/drawing/2014/main" id="{D7214C4B-A58F-E2A3-088D-F16A4BB8E64A}"/>
+              </a:ext>
+            </a:extLst>
+          </p:cNvPr>
+          <p:cNvSpPr/>
+          <p:nvPr/>
+        </p:nvSpPr>
+        <p:spPr>
+          <a:xfrm>
+            <a:off x="6675753" y="3588968"/>
+            <a:ext cx="988768" cy="293399"/>
+          </a:xfrm>
+          <a:prstGeom prst="ellipse">
+            <a:avLst/>
+          </a:prstGeom>
+          <a:noFill/>
+          <a:ln w="38100">
+            <a:solidFill>
+              <a:srgbClr val="FF0000"/>
+            </a:solidFill>
+          </a:ln>
+        </p:spPr>
+        <p:style>
+          <a:lnRef idx="2">
+            <a:schemeClr val="accent1">
+              <a:shade val="15000"/>
+            </a:schemeClr>
+          </a:lnRef>
+          <a:fillRef idx="1">
+            <a:schemeClr val="accent1"/>
+          </a:fillRef>
+          <a:effectRef idx="0">
+            <a:schemeClr val="accent1"/>
+          </a:effectRef>
+          <a:fontRef idx="minor">
+            <a:schemeClr val="lt1"/>
+          </a:fontRef>
+        </p:style>
+        <p:txBody>
+          <a:bodyPr rtlCol="0" anchor="ctr"/>
+          <a:lstStyle/>
+          <a:p>
+            <a:pPr algn="ctr"/>
+            <a:endParaRPr lang="en-CH"/>
+          </a:p>
+        </p:txBody>
+      </p:sp>
+      <p:pic>
+        <p:nvPicPr>
+          <p:cNvPr id="9" name="Picture 8">
+            <a:extLst>
+              <a:ext uri="{FF2B5EF4-FFF2-40B4-BE49-F238E27FC236}">
+                <a16:creationId xmlns:a16="http://schemas.microsoft.com/office/drawing/2014/main" id="{7EAD2400-C04F-6087-A3B6-2B56EBE8BD9D}"/>
+              </a:ext>
+            </a:extLst>
+          </p:cNvPr>
+          <p:cNvPicPr>
+            <a:picLocks noChangeAspect="1"/>
+          </p:cNvPicPr>
+          <p:nvPr/>
+        </p:nvPicPr>
+        <p:blipFill>
+          <a:blip r:embed="rId3"/>
+          <a:stretch>
+            <a:fillRect/>
+          </a:stretch>
+        </p:blipFill>
+        <p:spPr>
+          <a:xfrm>
+            <a:off x="5666507" y="4681177"/>
+            <a:ext cx="3007260" cy="1723261"/>
+          </a:xfrm>
+          <a:prstGeom prst="rect">
+            <a:avLst/>
+          </a:prstGeom>
+        </p:spPr>
+      </p:pic>
     </p:spTree>
     <p:extLst>
       <p:ext uri="{BB962C8B-B14F-4D97-AF65-F5344CB8AC3E}">
-        <p14:creationId xmlns:p14="http://schemas.microsoft.com/office/powerpoint/2010/main" val="3515892943"/>
+        <p14:creationId xmlns:p14="http://schemas.microsoft.com/office/powerpoint/2010/main" val="1797341619"/>
       </p:ext>
     </p:extLst>
   </p:cSld>
@@ -3444,7 +3785,7 @@
           <p:cNvPr id="4" name="TextBox 3">
             <a:extLst>
               <a:ext uri="{FF2B5EF4-FFF2-40B4-BE49-F238E27FC236}">
-                <a16:creationId xmlns:a16="http://schemas.microsoft.com/office/drawing/2014/main" id="{34054009-5E5F-FC54-C844-64F89752A3AD}"/>
+                <a16:creationId xmlns:a16="http://schemas.microsoft.com/office/drawing/2014/main" id="{F6C99D8C-3ACF-F066-E630-6DDBD48A7B01}"/>
               </a:ext>
             </a:extLst>
           </p:cNvPr>
@@ -3453,13 +3794,18 @@
         </p:nvSpPr>
         <p:spPr>
           <a:xfrm>
-            <a:off x="304800" y="185057"/>
-            <a:ext cx="11451771" cy="646331"/>
+            <a:off x="370112" y="2936428"/>
+            <a:ext cx="11451771" cy="1938992"/>
           </a:xfrm>
           <a:prstGeom prst="rect">
             <a:avLst/>
           </a:prstGeom>
-          <a:noFill/>
+          <a:solidFill>
+            <a:schemeClr val="accent1">
+              <a:lumMod val="40000"/>
+              <a:lumOff val="60000"/>
+            </a:schemeClr>
+          </a:solidFill>
         </p:spPr>
         <p:txBody>
           <a:bodyPr wrap="square" rtlCol="0">
@@ -3467,98 +3813,70 @@
           </a:bodyPr>
           <a:lstStyle/>
           <a:p>
-            <a:pPr marL="342900" indent="-342900">
-              <a:buFont typeface="Arial" panose="020B0604020202020204" pitchFamily="34" charset="0"/>
-              <a:buChar char="•"/>
-            </a:pPr>
-            <a:r>
-              <a:rPr lang="en-CH" dirty="0">
-                <a:latin typeface="Arial" panose="020B0604020202020204" pitchFamily="34" charset="0"/>
-                <a:cs typeface="Arial" panose="020B0604020202020204" pitchFamily="34" charset="0"/>
-              </a:rPr>
-              <a:t>Install Pycharm</a:t>
-            </a:r>
-          </a:p>
-          <a:p>
-            <a:pPr marL="342900" indent="-342900">
-              <a:buFont typeface="Arial" panose="020B0604020202020204" pitchFamily="34" charset="0"/>
-              <a:buChar char="•"/>
-            </a:pPr>
-            <a:r>
-              <a:rPr lang="en-CH" dirty="0">
-                <a:latin typeface="Arial" panose="020B0604020202020204" pitchFamily="34" charset="0"/>
-                <a:cs typeface="Arial" panose="020B0604020202020204" pitchFamily="34" charset="0"/>
-              </a:rPr>
-              <a:t>Ordner </a:t>
-            </a:r>
-            <a:r>
-              <a:rPr lang="en-CH" b="1" u="sng" dirty="0">
-                <a:latin typeface="Arial" panose="020B0604020202020204" pitchFamily="34" charset="0"/>
-                <a:cs typeface="Arial" panose="020B0604020202020204" pitchFamily="34" charset="0"/>
-              </a:rPr>
-              <a:t>venv</a:t>
-            </a:r>
-            <a:r>
-              <a:rPr lang="en-CH" dirty="0">
-                <a:latin typeface="Arial" panose="020B0604020202020204" pitchFamily="34" charset="0"/>
-                <a:cs typeface="Arial" panose="020B0604020202020204" pitchFamily="34" charset="0"/>
-              </a:rPr>
-              <a:t> im Projektordner erstellen</a:t>
-            </a:r>
-          </a:p>
-        </p:txBody>
-      </p:sp>
-      <p:pic>
-        <p:nvPicPr>
-          <p:cNvPr id="6" name="Picture 5">
-            <a:extLst>
-              <a:ext uri="{FF2B5EF4-FFF2-40B4-BE49-F238E27FC236}">
-                <a16:creationId xmlns:a16="http://schemas.microsoft.com/office/drawing/2014/main" id="{2C3BDE50-D054-0C3F-9E54-829249C76747}"/>
-              </a:ext>
-            </a:extLst>
-          </p:cNvPr>
-          <p:cNvPicPr>
-            <a:picLocks noChangeAspect="1"/>
-          </p:cNvPicPr>
+            <a:pPr algn="ctr"/>
+            <a:r>
+              <a:rPr lang="en-CH" sz="3000" b="1" dirty="0">
+                <a:latin typeface="Arial" panose="020B0604020202020204" pitchFamily="34" charset="0"/>
+                <a:cs typeface="Arial" panose="020B0604020202020204" pitchFamily="34" charset="0"/>
+              </a:rPr>
+              <a:t>[1]</a:t>
+            </a:r>
+          </a:p>
+          <a:p>
+            <a:pPr algn="ctr"/>
+            <a:endParaRPr lang="en-CH" sz="3000" b="1" dirty="0">
+              <a:latin typeface="Arial" panose="020B0604020202020204" pitchFamily="34" charset="0"/>
+              <a:cs typeface="Arial" panose="020B0604020202020204" pitchFamily="34" charset="0"/>
+            </a:endParaRPr>
+          </a:p>
+          <a:p>
+            <a:pPr algn="ctr"/>
+            <a:r>
+              <a:rPr lang="en-CH" sz="3000" dirty="0">
+                <a:latin typeface="Arial" panose="020B0604020202020204" pitchFamily="34" charset="0"/>
+                <a:cs typeface="Arial" panose="020B0604020202020204" pitchFamily="34" charset="0"/>
+              </a:rPr>
+              <a:t>Install packages under</a:t>
+            </a:r>
+          </a:p>
+          <a:p>
+            <a:pPr algn="ctr"/>
+            <a:r>
+              <a:rPr lang="en-CH" sz="3000" dirty="0">
+                <a:latin typeface="Arial" panose="020B0604020202020204" pitchFamily="34" charset="0"/>
+                <a:cs typeface="Arial" panose="020B0604020202020204" pitchFamily="34" charset="0"/>
+              </a:rPr>
+              <a:t> virtual environment</a:t>
+            </a:r>
+          </a:p>
+        </p:txBody>
+      </p:sp>
+      <p:sp>
+        <p:nvSpPr>
+          <p:cNvPr id="2" name="TextBox 1">
+            <a:extLst>
+              <a:ext uri="{FF2B5EF4-FFF2-40B4-BE49-F238E27FC236}">
+                <a16:creationId xmlns:a16="http://schemas.microsoft.com/office/drawing/2014/main" id="{1646E52D-1CDA-1F51-7382-9765F9B0D127}"/>
+              </a:ext>
+            </a:extLst>
+          </p:cNvPr>
+          <p:cNvSpPr txBox="1"/>
           <p:nvPr/>
-        </p:nvPicPr>
-        <p:blipFill>
-          <a:blip r:embed="rId2"/>
-          <a:stretch>
-            <a:fillRect/>
-          </a:stretch>
-        </p:blipFill>
-        <p:spPr>
-          <a:xfrm>
-            <a:off x="715736" y="951131"/>
-            <a:ext cx="5282293" cy="3366493"/>
+        </p:nvSpPr>
+        <p:spPr>
+          <a:xfrm>
+            <a:off x="370111" y="258673"/>
+            <a:ext cx="11451771" cy="1631216"/>
           </a:xfrm>
           <a:prstGeom prst="rect">
             <a:avLst/>
           </a:prstGeom>
-        </p:spPr>
-      </p:pic>
-      <p:sp>
-        <p:nvSpPr>
-          <p:cNvPr id="9" name="TextBox 8">
-            <a:extLst>
-              <a:ext uri="{FF2B5EF4-FFF2-40B4-BE49-F238E27FC236}">
-                <a16:creationId xmlns:a16="http://schemas.microsoft.com/office/drawing/2014/main" id="{C7BD179E-D973-B703-2580-8B42FB69BF85}"/>
-              </a:ext>
-            </a:extLst>
-          </p:cNvPr>
-          <p:cNvSpPr txBox="1"/>
-          <p:nvPr/>
-        </p:nvSpPr>
-        <p:spPr>
-          <a:xfrm>
-            <a:off x="304799" y="4317624"/>
-            <a:ext cx="11451771" cy="646331"/>
-          </a:xfrm>
-          <a:prstGeom prst="rect">
-            <a:avLst/>
-          </a:prstGeom>
-          <a:noFill/>
+          <a:solidFill>
+            <a:schemeClr val="accent6">
+              <a:lumMod val="40000"/>
+              <a:lumOff val="60000"/>
+            </a:schemeClr>
+          </a:solidFill>
         </p:spPr>
         <p:txBody>
           <a:bodyPr wrap="square" rtlCol="0">
@@ -3566,356 +3884,73 @@
           </a:bodyPr>
           <a:lstStyle/>
           <a:p>
-            <a:pPr marL="342900" indent="-342900">
-              <a:buFont typeface="Arial" panose="020B0604020202020204" pitchFamily="34" charset="0"/>
-              <a:buChar char="•"/>
-            </a:pPr>
-            <a:r>
-              <a:rPr lang="en-CH" dirty="0">
-                <a:latin typeface="Arial" panose="020B0604020202020204" pitchFamily="34" charset="0"/>
-                <a:cs typeface="Arial" panose="020B0604020202020204" pitchFamily="34" charset="0"/>
-              </a:rPr>
-              <a:t>PyCharm &lt; Eistellungen &lt; Python Interpreter &lt; Add Interpreter &lt; </a:t>
-            </a:r>
-            <a:r>
-              <a:rPr lang="en-CH" b="1" u="sng" dirty="0">
-                <a:latin typeface="Arial" panose="020B0604020202020204" pitchFamily="34" charset="0"/>
-                <a:cs typeface="Arial" panose="020B0604020202020204" pitchFamily="34" charset="0"/>
-              </a:rPr>
-              <a:t>Add Local Interpreter</a:t>
-            </a:r>
-          </a:p>
-          <a:p>
-            <a:pPr marL="342900" indent="-342900">
-              <a:buFont typeface="Arial" panose="020B0604020202020204" pitchFamily="34" charset="0"/>
-              <a:buChar char="•"/>
-            </a:pPr>
-            <a:r>
-              <a:rPr lang="en-CH" dirty="0">
-                <a:latin typeface="Arial" panose="020B0604020202020204" pitchFamily="34" charset="0"/>
-                <a:cs typeface="Arial" panose="020B0604020202020204" pitchFamily="34" charset="0"/>
-              </a:rPr>
-              <a:t>Zuerst den Interpreter erstellen:</a:t>
-            </a:r>
-          </a:p>
-        </p:txBody>
-      </p:sp>
-      <p:pic>
-        <p:nvPicPr>
-          <p:cNvPr id="11" name="Picture 10">
-            <a:extLst>
-              <a:ext uri="{FF2B5EF4-FFF2-40B4-BE49-F238E27FC236}">
-                <a16:creationId xmlns:a16="http://schemas.microsoft.com/office/drawing/2014/main" id="{35C6C93E-6E24-C687-85FD-E8A9FCF443D1}"/>
-              </a:ext>
-            </a:extLst>
-          </p:cNvPr>
-          <p:cNvPicPr>
-            <a:picLocks noChangeAspect="1"/>
-          </p:cNvPicPr>
-          <p:nvPr/>
-        </p:nvPicPr>
-        <p:blipFill>
-          <a:blip r:embed="rId3"/>
-          <a:stretch>
-            <a:fillRect/>
-          </a:stretch>
-        </p:blipFill>
-        <p:spPr>
-          <a:xfrm>
-            <a:off x="715736" y="5138572"/>
-            <a:ext cx="6283779" cy="1292408"/>
-          </a:xfrm>
-          <a:prstGeom prst="rect">
-            <a:avLst/>
-          </a:prstGeom>
-        </p:spPr>
-      </p:pic>
-      <p:sp>
-        <p:nvSpPr>
-          <p:cNvPr id="12" name="Oval 11">
-            <a:extLst>
-              <a:ext uri="{FF2B5EF4-FFF2-40B4-BE49-F238E27FC236}">
-                <a16:creationId xmlns:a16="http://schemas.microsoft.com/office/drawing/2014/main" id="{B89751DD-B312-D02C-AA59-4D3CB0632AD5}"/>
-              </a:ext>
-            </a:extLst>
-          </p:cNvPr>
-          <p:cNvSpPr/>
-          <p:nvPr/>
-        </p:nvSpPr>
-        <p:spPr>
-          <a:xfrm>
-            <a:off x="2373086" y="5138572"/>
-            <a:ext cx="707571" cy="293399"/>
-          </a:xfrm>
-          <a:prstGeom prst="ellipse">
-            <a:avLst/>
-          </a:prstGeom>
-          <a:noFill/>
-          <a:ln w="38100">
-            <a:solidFill>
-              <a:srgbClr val="FF0000"/>
-            </a:solidFill>
-          </a:ln>
-        </p:spPr>
-        <p:style>
-          <a:lnRef idx="2">
-            <a:schemeClr val="accent1">
-              <a:shade val="15000"/>
-            </a:schemeClr>
-          </a:lnRef>
-          <a:fillRef idx="1">
-            <a:schemeClr val="accent1"/>
-          </a:fillRef>
-          <a:effectRef idx="0">
-            <a:schemeClr val="accent1"/>
-          </a:effectRef>
-          <a:fontRef idx="minor">
-            <a:schemeClr val="lt1"/>
-          </a:fontRef>
-        </p:style>
-        <p:txBody>
-          <a:bodyPr rtlCol="0" anchor="ctr"/>
-          <a:lstStyle/>
-          <a:p>
             <a:pPr algn="ctr"/>
-            <a:endParaRPr lang="en-CH"/>
-          </a:p>
-        </p:txBody>
-      </p:sp>
-      <p:cxnSp>
-        <p:nvCxnSpPr>
-          <p:cNvPr id="16" name="Straight Arrow Connector 15">
-            <a:extLst>
-              <a:ext uri="{FF2B5EF4-FFF2-40B4-BE49-F238E27FC236}">
-                <a16:creationId xmlns:a16="http://schemas.microsoft.com/office/drawing/2014/main" id="{FE9A25D1-CCD7-43F1-E0D2-86B7B68D88A9}"/>
-              </a:ext>
-            </a:extLst>
-          </p:cNvPr>
-          <p:cNvCxnSpPr>
-            <a:cxnSpLocks/>
-            <a:stCxn id="19" idx="1"/>
-          </p:cNvCxnSpPr>
-          <p:nvPr/>
-        </p:nvCxnSpPr>
-        <p:spPr>
-          <a:xfrm flipH="1">
-            <a:off x="7184572" y="5947438"/>
-            <a:ext cx="742945" cy="4571"/>
-          </a:xfrm>
-          <a:prstGeom prst="straightConnector1">
-            <a:avLst/>
-          </a:prstGeom>
-          <a:ln w="19050">
-            <a:tailEnd type="triangle"/>
-          </a:ln>
-        </p:spPr>
-        <p:style>
-          <a:lnRef idx="1">
-            <a:schemeClr val="accent1"/>
-          </a:lnRef>
-          <a:fillRef idx="0">
-            <a:schemeClr val="accent1"/>
-          </a:fillRef>
-          <a:effectRef idx="0">
-            <a:schemeClr val="accent1"/>
-          </a:effectRef>
-          <a:fontRef idx="minor">
-            <a:schemeClr val="tx1"/>
-          </a:fontRef>
-        </p:style>
-      </p:cxnSp>
-      <p:cxnSp>
-        <p:nvCxnSpPr>
-          <p:cNvPr id="17" name="Straight Arrow Connector 16">
-            <a:extLst>
-              <a:ext uri="{FF2B5EF4-FFF2-40B4-BE49-F238E27FC236}">
-                <a16:creationId xmlns:a16="http://schemas.microsoft.com/office/drawing/2014/main" id="{A97BB808-8FF1-454C-0947-C24C8B7952BF}"/>
-              </a:ext>
-            </a:extLst>
-          </p:cNvPr>
-          <p:cNvCxnSpPr>
-            <a:cxnSpLocks/>
-          </p:cNvCxnSpPr>
-          <p:nvPr/>
-        </p:nvCxnSpPr>
-        <p:spPr>
-          <a:xfrm flipH="1">
-            <a:off x="7184571" y="5592780"/>
-            <a:ext cx="742946" cy="0"/>
-          </a:xfrm>
-          <a:prstGeom prst="straightConnector1">
-            <a:avLst/>
-          </a:prstGeom>
-          <a:ln w="19050">
-            <a:tailEnd type="triangle"/>
-          </a:ln>
-        </p:spPr>
-        <p:style>
-          <a:lnRef idx="1">
-            <a:schemeClr val="accent1"/>
-          </a:lnRef>
-          <a:fillRef idx="0">
-            <a:schemeClr val="accent1"/>
-          </a:fillRef>
-          <a:effectRef idx="0">
-            <a:schemeClr val="accent1"/>
-          </a:effectRef>
-          <a:fontRef idx="minor">
-            <a:schemeClr val="tx1"/>
-          </a:fontRef>
-        </p:style>
-      </p:cxnSp>
-      <p:sp>
-        <p:nvSpPr>
-          <p:cNvPr id="18" name="TextBox 17">
-            <a:extLst>
-              <a:ext uri="{FF2B5EF4-FFF2-40B4-BE49-F238E27FC236}">
-                <a16:creationId xmlns:a16="http://schemas.microsoft.com/office/drawing/2014/main" id="{8C079A2A-B959-607E-54A7-B9B5449320B1}"/>
-              </a:ext>
-            </a:extLst>
-          </p:cNvPr>
-          <p:cNvSpPr txBox="1"/>
-          <p:nvPr/>
-        </p:nvSpPr>
-        <p:spPr>
-          <a:xfrm>
-            <a:off x="7892142" y="5408114"/>
-            <a:ext cx="3513366" cy="323165"/>
-          </a:xfrm>
-          <a:prstGeom prst="rect">
-            <a:avLst/>
-          </a:prstGeom>
-          <a:noFill/>
-        </p:spPr>
-        <p:txBody>
-          <a:bodyPr wrap="square" rtlCol="0">
-            <a:spAutoFit/>
-          </a:bodyPr>
-          <a:lstStyle/>
-          <a:p>
-            <a:r>
-              <a:rPr lang="en-CH" sz="1500" dirty="0">
-                <a:latin typeface="Arial" panose="020B0604020202020204" pitchFamily="34" charset="0"/>
-                <a:cs typeface="Arial" panose="020B0604020202020204" pitchFamily="34" charset="0"/>
-              </a:rPr>
-              <a:t>Den venv ordner auswählen </a:t>
-            </a:r>
-          </a:p>
-        </p:txBody>
-      </p:sp>
-      <p:sp>
-        <p:nvSpPr>
-          <p:cNvPr id="19" name="TextBox 18">
-            <a:extLst>
-              <a:ext uri="{FF2B5EF4-FFF2-40B4-BE49-F238E27FC236}">
-                <a16:creationId xmlns:a16="http://schemas.microsoft.com/office/drawing/2014/main" id="{0AD3EDE6-3AFE-11EA-A7A7-1803085611B7}"/>
-              </a:ext>
-            </a:extLst>
-          </p:cNvPr>
-          <p:cNvSpPr txBox="1"/>
-          <p:nvPr/>
-        </p:nvSpPr>
-        <p:spPr>
-          <a:xfrm>
-            <a:off x="7927517" y="5785855"/>
-            <a:ext cx="4133853" cy="323165"/>
-          </a:xfrm>
-          <a:prstGeom prst="rect">
-            <a:avLst/>
-          </a:prstGeom>
-          <a:noFill/>
-        </p:spPr>
-        <p:txBody>
-          <a:bodyPr wrap="square" rtlCol="0">
-            <a:spAutoFit/>
-          </a:bodyPr>
-          <a:lstStyle/>
-          <a:p>
-            <a:r>
-              <a:rPr lang="en-CH" sz="1500" dirty="0">
-                <a:latin typeface="Arial" panose="020B0604020202020204" pitchFamily="34" charset="0"/>
-                <a:cs typeface="Arial" panose="020B0604020202020204" pitchFamily="34" charset="0"/>
-              </a:rPr>
-              <a:t>Lokalle (im PC) Python installation auswählen</a:t>
-            </a:r>
-          </a:p>
-        </p:txBody>
-      </p:sp>
-      <p:cxnSp>
-        <p:nvCxnSpPr>
-          <p:cNvPr id="23" name="Straight Arrow Connector 22">
-            <a:extLst>
-              <a:ext uri="{FF2B5EF4-FFF2-40B4-BE49-F238E27FC236}">
-                <a16:creationId xmlns:a16="http://schemas.microsoft.com/office/drawing/2014/main" id="{1501CA96-01E4-755B-E75D-8DEBABA83A19}"/>
-              </a:ext>
-            </a:extLst>
-          </p:cNvPr>
-          <p:cNvCxnSpPr>
-            <a:cxnSpLocks/>
-          </p:cNvCxnSpPr>
-          <p:nvPr/>
-        </p:nvCxnSpPr>
-        <p:spPr>
-          <a:xfrm flipH="1">
-            <a:off x="2762245" y="6278581"/>
-            <a:ext cx="5165272" cy="0"/>
-          </a:xfrm>
-          <a:prstGeom prst="straightConnector1">
-            <a:avLst/>
-          </a:prstGeom>
-          <a:ln w="19050">
-            <a:tailEnd type="triangle"/>
-          </a:ln>
-        </p:spPr>
-        <p:style>
-          <a:lnRef idx="1">
-            <a:schemeClr val="accent1"/>
-          </a:lnRef>
-          <a:fillRef idx="0">
-            <a:schemeClr val="accent1"/>
-          </a:fillRef>
-          <a:effectRef idx="0">
-            <a:schemeClr val="accent1"/>
-          </a:effectRef>
-          <a:fontRef idx="minor">
-            <a:schemeClr val="tx1"/>
-          </a:fontRef>
-        </p:style>
-      </p:cxnSp>
-      <p:sp>
-        <p:nvSpPr>
-          <p:cNvPr id="25" name="TextBox 24">
-            <a:extLst>
-              <a:ext uri="{FF2B5EF4-FFF2-40B4-BE49-F238E27FC236}">
-                <a16:creationId xmlns:a16="http://schemas.microsoft.com/office/drawing/2014/main" id="{394FDB3C-37AB-30B6-9964-0A6C5ADEB833}"/>
-              </a:ext>
-            </a:extLst>
-          </p:cNvPr>
-          <p:cNvSpPr txBox="1"/>
-          <p:nvPr/>
-        </p:nvSpPr>
-        <p:spPr>
-          <a:xfrm>
-            <a:off x="7907099" y="6121697"/>
-            <a:ext cx="4133853" cy="553998"/>
-          </a:xfrm>
-          <a:prstGeom prst="rect">
-            <a:avLst/>
-          </a:prstGeom>
-          <a:noFill/>
-        </p:spPr>
-        <p:txBody>
-          <a:bodyPr wrap="square" rtlCol="0">
-            <a:spAutoFit/>
-          </a:bodyPr>
-          <a:lstStyle/>
-          <a:p>
-            <a:r>
-              <a:rPr lang="en-CH" sz="1500" dirty="0">
-                <a:latin typeface="Arial" panose="020B0604020202020204" pitchFamily="34" charset="0"/>
-                <a:cs typeface="Arial" panose="020B0604020202020204" pitchFamily="34" charset="0"/>
-              </a:rPr>
-              <a:t>Am liebsten leer lassen, sodass alle abhängigkeiten im Projekt bleiben!</a:t>
+            <a:r>
+              <a:rPr lang="en-CH" sz="2500" u="sng" dirty="0">
+                <a:latin typeface="Arial" panose="020B0604020202020204" pitchFamily="34" charset="0"/>
+                <a:cs typeface="Arial" panose="020B0604020202020204" pitchFamily="34" charset="0"/>
+              </a:rPr>
+              <a:t>Preparation steps for</a:t>
+            </a:r>
+            <a:r>
+              <a:rPr lang="en-CH" sz="2500" dirty="0">
+                <a:latin typeface="Arial" panose="020B0604020202020204" pitchFamily="34" charset="0"/>
+                <a:cs typeface="Arial" panose="020B0604020202020204" pitchFamily="34" charset="0"/>
+              </a:rPr>
+              <a:t>:</a:t>
+            </a:r>
+          </a:p>
+          <a:p>
+            <a:pPr algn="ctr"/>
+            <a:endParaRPr lang="en-CH" sz="2500" dirty="0">
+              <a:latin typeface="Arial" panose="020B0604020202020204" pitchFamily="34" charset="0"/>
+              <a:cs typeface="Arial" panose="020B0604020202020204" pitchFamily="34" charset="0"/>
+            </a:endParaRPr>
+          </a:p>
+          <a:p>
+            <a:r>
+              <a:rPr lang="en-CH" sz="2500" dirty="0">
+                <a:latin typeface="Arial" panose="020B0604020202020204" pitchFamily="34" charset="0"/>
+                <a:cs typeface="Arial" panose="020B0604020202020204" pitchFamily="34" charset="0"/>
+              </a:rPr>
+              <a:t>- Part 1: Custom Inf. </a:t>
+            </a:r>
+            <a:r>
+              <a:rPr lang="en-GB" sz="2500" dirty="0">
+                <a:latin typeface="Arial" panose="020B0604020202020204" pitchFamily="34" charset="0"/>
+                <a:cs typeface="Arial" panose="020B0604020202020204" pitchFamily="34" charset="0"/>
+              </a:rPr>
+              <a:t>R</a:t>
+            </a:r>
+            <a:r>
+              <a:rPr lang="en-CH" sz="2500" dirty="0">
+                <a:latin typeface="Arial" panose="020B0604020202020204" pitchFamily="34" charset="0"/>
+                <a:cs typeface="Arial" panose="020B0604020202020204" pitchFamily="34" charset="0"/>
+              </a:rPr>
+              <a:t>etrieval System (CIRS)</a:t>
+            </a:r>
+          </a:p>
+          <a:p>
+            <a:r>
+              <a:rPr lang="en-CH" sz="2500" dirty="0">
+                <a:latin typeface="Arial" panose="020B0604020202020204" pitchFamily="34" charset="0"/>
+                <a:cs typeface="Arial" panose="020B0604020202020204" pitchFamily="34" charset="0"/>
+              </a:rPr>
+              <a:t>- Part 2: Comparison with PyS</a:t>
+            </a:r>
+            <a:r>
+              <a:rPr lang="en-GB" sz="2500" dirty="0">
+                <a:latin typeface="Arial" panose="020B0604020202020204" pitchFamily="34" charset="0"/>
+                <a:cs typeface="Arial" panose="020B0604020202020204" pitchFamily="34" charset="0"/>
+              </a:rPr>
+              <a:t>o</a:t>
+            </a:r>
+            <a:r>
+              <a:rPr lang="en-CH" sz="2500" dirty="0">
+                <a:latin typeface="Arial" panose="020B0604020202020204" pitchFamily="34" charset="0"/>
+                <a:cs typeface="Arial" panose="020B0604020202020204" pitchFamily="34" charset="0"/>
+              </a:rPr>
+              <a:t>lar </a:t>
             </a:r>
           </a:p>
         </p:txBody>
@@ -3923,7 +3958,7 @@
     </p:spTree>
     <p:extLst>
       <p:ext uri="{BB962C8B-B14F-4D97-AF65-F5344CB8AC3E}">
-        <p14:creationId xmlns:p14="http://schemas.microsoft.com/office/powerpoint/2010/main" val="513564311"/>
+        <p14:creationId xmlns:p14="http://schemas.microsoft.com/office/powerpoint/2010/main" val="3895257231"/>
       </p:ext>
     </p:extLst>
   </p:cSld>
@@ -3987,7 +4022,20 @@
                 <a:latin typeface="Arial" panose="020B0604020202020204" pitchFamily="34" charset="0"/>
                 <a:cs typeface="Arial" panose="020B0604020202020204" pitchFamily="34" charset="0"/>
               </a:rPr>
-              <a:t>Sicherstellen, dass der </a:t>
+              <a:t>Install Pycharm</a:t>
+            </a:r>
+          </a:p>
+          <a:p>
+            <a:pPr marL="342900" indent="-342900">
+              <a:buFont typeface="Arial" panose="020B0604020202020204" pitchFamily="34" charset="0"/>
+              <a:buChar char="•"/>
+            </a:pPr>
+            <a:r>
+              <a:rPr lang="en-CH" dirty="0">
+                <a:latin typeface="Arial" panose="020B0604020202020204" pitchFamily="34" charset="0"/>
+                <a:cs typeface="Arial" panose="020B0604020202020204" pitchFamily="34" charset="0"/>
+              </a:rPr>
+              <a:t>Ordner </a:t>
             </a:r>
             <a:r>
               <a:rPr lang="en-CH" b="1" u="sng" dirty="0">
@@ -4001,30 +4049,17 @@
                 <a:latin typeface="Arial" panose="020B0604020202020204" pitchFamily="34" charset="0"/>
                 <a:cs typeface="Arial" panose="020B0604020202020204" pitchFamily="34" charset="0"/>
               </a:rPr>
-              <a:t> als interpreter ausgewählt wurde:</a:t>
-            </a:r>
-            <a:br>
-              <a:rPr lang="en-CH" dirty="0">
-                <a:latin typeface="Arial" panose="020B0604020202020204" pitchFamily="34" charset="0"/>
-                <a:cs typeface="Arial" panose="020B0604020202020204" pitchFamily="34" charset="0"/>
-              </a:rPr>
-            </a:br>
-            <a:r>
-              <a:rPr lang="en-CH" dirty="0">
-                <a:latin typeface="Arial" panose="020B0604020202020204" pitchFamily="34" charset="0"/>
-                <a:cs typeface="Arial" panose="020B0604020202020204" pitchFamily="34" charset="0"/>
-              </a:rPr>
-              <a:t>PyCharm &lt; Eistellungen &lt; Python Interpreter</a:t>
+              <a:t> im Projektordner erstellen</a:t>
             </a:r>
           </a:p>
         </p:txBody>
       </p:sp>
       <p:pic>
         <p:nvPicPr>
-          <p:cNvPr id="7" name="Picture 6">
-            <a:extLst>
-              <a:ext uri="{FF2B5EF4-FFF2-40B4-BE49-F238E27FC236}">
-                <a16:creationId xmlns:a16="http://schemas.microsoft.com/office/drawing/2014/main" id="{977706C5-5C48-6055-CEE7-3E311481B004}"/>
+          <p:cNvPr id="6" name="Picture 5">
+            <a:extLst>
+              <a:ext uri="{FF2B5EF4-FFF2-40B4-BE49-F238E27FC236}">
+                <a16:creationId xmlns:a16="http://schemas.microsoft.com/office/drawing/2014/main" id="{2C3BDE50-D054-0C3F-9E54-829249C76747}"/>
               </a:ext>
             </a:extLst>
           </p:cNvPr>
@@ -4041,8 +4076,8 @@
         </p:blipFill>
         <p:spPr>
           <a:xfrm>
-            <a:off x="715736" y="905991"/>
-            <a:ext cx="7176406" cy="1876289"/>
+            <a:off x="715736" y="951131"/>
+            <a:ext cx="5282293" cy="3366493"/>
           </a:xfrm>
           <a:prstGeom prst="rect">
             <a:avLst/>
@@ -4051,6 +4086,98 @@
       </p:pic>
       <p:sp>
         <p:nvSpPr>
+          <p:cNvPr id="9" name="TextBox 8">
+            <a:extLst>
+              <a:ext uri="{FF2B5EF4-FFF2-40B4-BE49-F238E27FC236}">
+                <a16:creationId xmlns:a16="http://schemas.microsoft.com/office/drawing/2014/main" id="{C7BD179E-D973-B703-2580-8B42FB69BF85}"/>
+              </a:ext>
+            </a:extLst>
+          </p:cNvPr>
+          <p:cNvSpPr txBox="1"/>
+          <p:nvPr/>
+        </p:nvSpPr>
+        <p:spPr>
+          <a:xfrm>
+            <a:off x="304799" y="4317624"/>
+            <a:ext cx="11451771" cy="646331"/>
+          </a:xfrm>
+          <a:prstGeom prst="rect">
+            <a:avLst/>
+          </a:prstGeom>
+          <a:noFill/>
+        </p:spPr>
+        <p:txBody>
+          <a:bodyPr wrap="square" rtlCol="0">
+            <a:spAutoFit/>
+          </a:bodyPr>
+          <a:lstStyle/>
+          <a:p>
+            <a:pPr marL="342900" indent="-342900">
+              <a:buFont typeface="Arial" panose="020B0604020202020204" pitchFamily="34" charset="0"/>
+              <a:buChar char="•"/>
+            </a:pPr>
+            <a:r>
+              <a:rPr lang="en-CH" dirty="0">
+                <a:latin typeface="Arial" panose="020B0604020202020204" pitchFamily="34" charset="0"/>
+                <a:cs typeface="Arial" panose="020B0604020202020204" pitchFamily="34" charset="0"/>
+              </a:rPr>
+              <a:t>PyCharm &lt; Eistellungen &lt; Python Interpreter &lt; Add Interpreter &lt; </a:t>
+            </a:r>
+            <a:r>
+              <a:rPr lang="en-CH" b="1" u="sng" dirty="0">
+                <a:latin typeface="Arial" panose="020B0604020202020204" pitchFamily="34" charset="0"/>
+                <a:cs typeface="Arial" panose="020B0604020202020204" pitchFamily="34" charset="0"/>
+              </a:rPr>
+              <a:t>Add Local Interpreter</a:t>
+            </a:r>
+          </a:p>
+          <a:p>
+            <a:pPr marL="342900" indent="-342900">
+              <a:buFont typeface="Arial" panose="020B0604020202020204" pitchFamily="34" charset="0"/>
+              <a:buChar char="•"/>
+            </a:pPr>
+            <a:r>
+              <a:rPr lang="en-CH" dirty="0">
+                <a:latin typeface="Arial" panose="020B0604020202020204" pitchFamily="34" charset="0"/>
+                <a:cs typeface="Arial" panose="020B0604020202020204" pitchFamily="34" charset="0"/>
+              </a:rPr>
+              <a:t>Zuerst den Interpreter erstellen:</a:t>
+            </a:r>
+          </a:p>
+        </p:txBody>
+      </p:sp>
+      <p:pic>
+        <p:nvPicPr>
+          <p:cNvPr id="11" name="Picture 10">
+            <a:extLst>
+              <a:ext uri="{FF2B5EF4-FFF2-40B4-BE49-F238E27FC236}">
+                <a16:creationId xmlns:a16="http://schemas.microsoft.com/office/drawing/2014/main" id="{35C6C93E-6E24-C687-85FD-E8A9FCF443D1}"/>
+              </a:ext>
+            </a:extLst>
+          </p:cNvPr>
+          <p:cNvPicPr>
+            <a:picLocks noChangeAspect="1"/>
+          </p:cNvPicPr>
+          <p:nvPr/>
+        </p:nvPicPr>
+        <p:blipFill>
+          <a:blip r:embed="rId3"/>
+          <a:stretch>
+            <a:fillRect/>
+          </a:stretch>
+        </p:blipFill>
+        <p:spPr>
+          <a:xfrm>
+            <a:off x="715736" y="5138572"/>
+            <a:ext cx="6283779" cy="1292408"/>
+          </a:xfrm>
+          <a:prstGeom prst="rect">
+            <a:avLst/>
+          </a:prstGeom>
+        </p:spPr>
+      </p:pic>
+      <p:sp>
+        <p:nvSpPr>
           <p:cNvPr id="12" name="Oval 11">
             <a:extLst>
               <a:ext uri="{FF2B5EF4-FFF2-40B4-BE49-F238E27FC236}">
@@ -4063,7 +4190,7 @@
         </p:nvSpPr>
         <p:spPr>
           <a:xfrm>
-            <a:off x="1719943" y="2520455"/>
+            <a:off x="2373086" y="5138572"/>
             <a:ext cx="707571" cy="293399"/>
           </a:xfrm>
           <a:prstGeom prst="ellipse">
@@ -4101,100 +4228,25 @@
           </a:p>
         </p:txBody>
       </p:sp>
-      <p:pic>
-        <p:nvPicPr>
-          <p:cNvPr id="15" name="Picture 14">
-            <a:extLst>
-              <a:ext uri="{FF2B5EF4-FFF2-40B4-BE49-F238E27FC236}">
-                <a16:creationId xmlns:a16="http://schemas.microsoft.com/office/drawing/2014/main" id="{06D4A4BC-38DA-C8A0-C7CE-F70C8A942219}"/>
-              </a:ext>
-            </a:extLst>
-          </p:cNvPr>
-          <p:cNvPicPr>
-            <a:picLocks noChangeAspect="1"/>
-          </p:cNvPicPr>
-          <p:nvPr/>
-        </p:nvPicPr>
-        <p:blipFill>
-          <a:blip r:embed="rId3"/>
-          <a:stretch>
-            <a:fillRect/>
-          </a:stretch>
-        </p:blipFill>
-        <p:spPr>
-          <a:xfrm>
-            <a:off x="715736" y="3322737"/>
-            <a:ext cx="8335797" cy="765923"/>
-          </a:xfrm>
-          <a:prstGeom prst="rect">
-            <a:avLst/>
-          </a:prstGeom>
-        </p:spPr>
-      </p:pic>
-      <p:sp>
-        <p:nvSpPr>
-          <p:cNvPr id="20" name="Down Arrow 19">
-            <a:extLst>
-              <a:ext uri="{FF2B5EF4-FFF2-40B4-BE49-F238E27FC236}">
-                <a16:creationId xmlns:a16="http://schemas.microsoft.com/office/drawing/2014/main" id="{6699EC53-AFF7-314C-E071-F5864057908D}"/>
-              </a:ext>
-            </a:extLst>
-          </p:cNvPr>
-          <p:cNvSpPr/>
-          <p:nvPr/>
-        </p:nvSpPr>
-        <p:spPr>
-          <a:xfrm>
-            <a:off x="4541178" y="2813854"/>
-            <a:ext cx="503433" cy="435699"/>
-          </a:xfrm>
-          <a:prstGeom prst="downArrow">
-            <a:avLst/>
-          </a:prstGeom>
-        </p:spPr>
-        <p:style>
-          <a:lnRef idx="2">
-            <a:schemeClr val="accent1">
-              <a:shade val="15000"/>
-            </a:schemeClr>
-          </a:lnRef>
-          <a:fillRef idx="1">
-            <a:schemeClr val="accent1"/>
-          </a:fillRef>
-          <a:effectRef idx="0">
-            <a:schemeClr val="accent1"/>
-          </a:effectRef>
-          <a:fontRef idx="minor">
-            <a:schemeClr val="lt1"/>
-          </a:fontRef>
-        </p:style>
-        <p:txBody>
-          <a:bodyPr rtlCol="0" anchor="ctr"/>
-          <a:lstStyle/>
-          <a:p>
-            <a:pPr algn="ctr"/>
-            <a:endParaRPr lang="en-CH"/>
-          </a:p>
-        </p:txBody>
-      </p:sp>
       <p:cxnSp>
         <p:nvCxnSpPr>
-          <p:cNvPr id="22" name="Straight Arrow Connector 21">
-            <a:extLst>
-              <a:ext uri="{FF2B5EF4-FFF2-40B4-BE49-F238E27FC236}">
-                <a16:creationId xmlns:a16="http://schemas.microsoft.com/office/drawing/2014/main" id="{606D27A5-43E0-8761-11F7-E1F64EC1ACF5}"/>
+          <p:cNvPr id="16" name="Straight Arrow Connector 15">
+            <a:extLst>
+              <a:ext uri="{FF2B5EF4-FFF2-40B4-BE49-F238E27FC236}">
+                <a16:creationId xmlns:a16="http://schemas.microsoft.com/office/drawing/2014/main" id="{FE9A25D1-CCD7-43F1-E0D2-86B7B68D88A9}"/>
               </a:ext>
             </a:extLst>
           </p:cNvPr>
           <p:cNvCxnSpPr>
             <a:cxnSpLocks/>
+            <a:stCxn id="19" idx="1"/>
           </p:cNvCxnSpPr>
           <p:nvPr/>
         </p:nvCxnSpPr>
         <p:spPr>
           <a:xfrm flipH="1">
-            <a:off x="7169859" y="3771686"/>
-            <a:ext cx="2261817" cy="0"/>
+            <a:off x="7184572" y="5947438"/>
+            <a:ext cx="742945" cy="4571"/>
           </a:xfrm>
           <a:prstGeom prst="straightConnector1">
             <a:avLst/>
@@ -4218,12 +4270,53 @@
           </a:fontRef>
         </p:style>
       </p:cxnSp>
-      <p:sp>
-        <p:nvSpPr>
-          <p:cNvPr id="24" name="TextBox 23">
-            <a:extLst>
-              <a:ext uri="{FF2B5EF4-FFF2-40B4-BE49-F238E27FC236}">
-                <a16:creationId xmlns:a16="http://schemas.microsoft.com/office/drawing/2014/main" id="{CD715062-50B9-4CAE-9AEC-76A372DD4407}"/>
+      <p:cxnSp>
+        <p:nvCxnSpPr>
+          <p:cNvPr id="17" name="Straight Arrow Connector 16">
+            <a:extLst>
+              <a:ext uri="{FF2B5EF4-FFF2-40B4-BE49-F238E27FC236}">
+                <a16:creationId xmlns:a16="http://schemas.microsoft.com/office/drawing/2014/main" id="{A97BB808-8FF1-454C-0947-C24C8B7952BF}"/>
+              </a:ext>
+            </a:extLst>
+          </p:cNvPr>
+          <p:cNvCxnSpPr>
+            <a:cxnSpLocks/>
+          </p:cNvCxnSpPr>
+          <p:nvPr/>
+        </p:nvCxnSpPr>
+        <p:spPr>
+          <a:xfrm flipH="1">
+            <a:off x="7184571" y="5592780"/>
+            <a:ext cx="742946" cy="0"/>
+          </a:xfrm>
+          <a:prstGeom prst="straightConnector1">
+            <a:avLst/>
+          </a:prstGeom>
+          <a:ln w="19050">
+            <a:tailEnd type="triangle"/>
+          </a:ln>
+        </p:spPr>
+        <p:style>
+          <a:lnRef idx="1">
+            <a:schemeClr val="accent1"/>
+          </a:lnRef>
+          <a:fillRef idx="0">
+            <a:schemeClr val="accent1"/>
+          </a:fillRef>
+          <a:effectRef idx="0">
+            <a:schemeClr val="accent1"/>
+          </a:effectRef>
+          <a:fontRef idx="minor">
+            <a:schemeClr val="tx1"/>
+          </a:fontRef>
+        </p:style>
+      </p:cxnSp>
+      <p:sp>
+        <p:nvSpPr>
+          <p:cNvPr id="18" name="TextBox 17">
+            <a:extLst>
+              <a:ext uri="{FF2B5EF4-FFF2-40B4-BE49-F238E27FC236}">
+                <a16:creationId xmlns:a16="http://schemas.microsoft.com/office/drawing/2014/main" id="{8C079A2A-B959-607E-54A7-B9B5449320B1}"/>
               </a:ext>
             </a:extLst>
           </p:cNvPr>
@@ -4232,8 +4325,8 @@
         </p:nvSpPr>
         <p:spPr>
           <a:xfrm>
-            <a:off x="9431676" y="3428699"/>
-            <a:ext cx="2325601" cy="553998"/>
+            <a:off x="7892142" y="5408114"/>
+            <a:ext cx="3513366" cy="323165"/>
           </a:xfrm>
           <a:prstGeom prst="rect">
             <a:avLst/>
@@ -4251,7 +4344,124 @@
                 <a:latin typeface="Arial" panose="020B0604020202020204" pitchFamily="34" charset="0"/>
                 <a:cs typeface="Arial" panose="020B0604020202020204" pitchFamily="34" charset="0"/>
               </a:rPr>
-              <a:t>Auswählen. Der Auswahl wird nicht gespeichert.</a:t>
+              <a:t>Den venv ordner auswählen </a:t>
+            </a:r>
+          </a:p>
+        </p:txBody>
+      </p:sp>
+      <p:sp>
+        <p:nvSpPr>
+          <p:cNvPr id="19" name="TextBox 18">
+            <a:extLst>
+              <a:ext uri="{FF2B5EF4-FFF2-40B4-BE49-F238E27FC236}">
+                <a16:creationId xmlns:a16="http://schemas.microsoft.com/office/drawing/2014/main" id="{0AD3EDE6-3AFE-11EA-A7A7-1803085611B7}"/>
+              </a:ext>
+            </a:extLst>
+          </p:cNvPr>
+          <p:cNvSpPr txBox="1"/>
+          <p:nvPr/>
+        </p:nvSpPr>
+        <p:spPr>
+          <a:xfrm>
+            <a:off x="7927517" y="5785855"/>
+            <a:ext cx="4133853" cy="323165"/>
+          </a:xfrm>
+          <a:prstGeom prst="rect">
+            <a:avLst/>
+          </a:prstGeom>
+          <a:noFill/>
+        </p:spPr>
+        <p:txBody>
+          <a:bodyPr wrap="square" rtlCol="0">
+            <a:spAutoFit/>
+          </a:bodyPr>
+          <a:lstStyle/>
+          <a:p>
+            <a:r>
+              <a:rPr lang="en-CH" sz="1500" dirty="0">
+                <a:latin typeface="Arial" panose="020B0604020202020204" pitchFamily="34" charset="0"/>
+                <a:cs typeface="Arial" panose="020B0604020202020204" pitchFamily="34" charset="0"/>
+              </a:rPr>
+              <a:t>Lokalle (im PC) Python installation auswählen</a:t>
+            </a:r>
+          </a:p>
+        </p:txBody>
+      </p:sp>
+      <p:cxnSp>
+        <p:nvCxnSpPr>
+          <p:cNvPr id="23" name="Straight Arrow Connector 22">
+            <a:extLst>
+              <a:ext uri="{FF2B5EF4-FFF2-40B4-BE49-F238E27FC236}">
+                <a16:creationId xmlns:a16="http://schemas.microsoft.com/office/drawing/2014/main" id="{1501CA96-01E4-755B-E75D-8DEBABA83A19}"/>
+              </a:ext>
+            </a:extLst>
+          </p:cNvPr>
+          <p:cNvCxnSpPr>
+            <a:cxnSpLocks/>
+          </p:cNvCxnSpPr>
+          <p:nvPr/>
+        </p:nvCxnSpPr>
+        <p:spPr>
+          <a:xfrm flipH="1">
+            <a:off x="2762245" y="6278581"/>
+            <a:ext cx="5165272" cy="0"/>
+          </a:xfrm>
+          <a:prstGeom prst="straightConnector1">
+            <a:avLst/>
+          </a:prstGeom>
+          <a:ln w="19050">
+            <a:tailEnd type="triangle"/>
+          </a:ln>
+        </p:spPr>
+        <p:style>
+          <a:lnRef idx="1">
+            <a:schemeClr val="accent1"/>
+          </a:lnRef>
+          <a:fillRef idx="0">
+            <a:schemeClr val="accent1"/>
+          </a:fillRef>
+          <a:effectRef idx="0">
+            <a:schemeClr val="accent1"/>
+          </a:effectRef>
+          <a:fontRef idx="minor">
+            <a:schemeClr val="tx1"/>
+          </a:fontRef>
+        </p:style>
+      </p:cxnSp>
+      <p:sp>
+        <p:nvSpPr>
+          <p:cNvPr id="25" name="TextBox 24">
+            <a:extLst>
+              <a:ext uri="{FF2B5EF4-FFF2-40B4-BE49-F238E27FC236}">
+                <a16:creationId xmlns:a16="http://schemas.microsoft.com/office/drawing/2014/main" id="{394FDB3C-37AB-30B6-9964-0A6C5ADEB833}"/>
+              </a:ext>
+            </a:extLst>
+          </p:cNvPr>
+          <p:cNvSpPr txBox="1"/>
+          <p:nvPr/>
+        </p:nvSpPr>
+        <p:spPr>
+          <a:xfrm>
+            <a:off x="7907099" y="6121697"/>
+            <a:ext cx="4133853" cy="553998"/>
+          </a:xfrm>
+          <a:prstGeom prst="rect">
+            <a:avLst/>
+          </a:prstGeom>
+          <a:noFill/>
+        </p:spPr>
+        <p:txBody>
+          <a:bodyPr wrap="square" rtlCol="0">
+            <a:spAutoFit/>
+          </a:bodyPr>
+          <a:lstStyle/>
+          <a:p>
+            <a:r>
+              <a:rPr lang="en-CH" sz="1500" dirty="0">
+                <a:latin typeface="Arial" panose="020B0604020202020204" pitchFamily="34" charset="0"/>
+                <a:cs typeface="Arial" panose="020B0604020202020204" pitchFamily="34" charset="0"/>
+              </a:rPr>
+              <a:t>Am liebsten leer lassen, sodass alle abhängigkeiten im Projekt bleiben!</a:t>
             </a:r>
           </a:p>
         </p:txBody>
@@ -4259,7 +4469,7 @@
     </p:spTree>
     <p:extLst>
       <p:ext uri="{BB962C8B-B14F-4D97-AF65-F5344CB8AC3E}">
-        <p14:creationId xmlns:p14="http://schemas.microsoft.com/office/powerpoint/2010/main" val="2425377629"/>
+        <p14:creationId xmlns:p14="http://schemas.microsoft.com/office/powerpoint/2010/main" val="513564311"/>
       </p:ext>
     </p:extLst>
   </p:cSld>
@@ -4288,10 +4498,10 @@
       </p:grpSpPr>
       <p:sp>
         <p:nvSpPr>
-          <p:cNvPr id="27" name="TextBox 26">
-            <a:extLst>
-              <a:ext uri="{FF2B5EF4-FFF2-40B4-BE49-F238E27FC236}">
-                <a16:creationId xmlns:a16="http://schemas.microsoft.com/office/drawing/2014/main" id="{1638E0EB-741B-2F11-5E0B-2D0DDEB0CCF2}"/>
+          <p:cNvPr id="4" name="TextBox 3">
+            <a:extLst>
+              <a:ext uri="{FF2B5EF4-FFF2-40B4-BE49-F238E27FC236}">
+                <a16:creationId xmlns:a16="http://schemas.microsoft.com/office/drawing/2014/main" id="{34054009-5E5F-FC54-C844-64F89752A3AD}"/>
               </a:ext>
             </a:extLst>
           </p:cNvPr>
@@ -4300,8 +4510,8 @@
         </p:nvSpPr>
         <p:spPr>
           <a:xfrm>
-            <a:off x="304799" y="169569"/>
-            <a:ext cx="11451771" cy="369332"/>
+            <a:off x="304800" y="185057"/>
+            <a:ext cx="11451771" cy="646331"/>
           </a:xfrm>
           <a:prstGeom prst="rect">
             <a:avLst/>
@@ -4323,17 +4533,44 @@
                 <a:latin typeface="Arial" panose="020B0604020202020204" pitchFamily="34" charset="0"/>
                 <a:cs typeface="Arial" panose="020B0604020202020204" pitchFamily="34" charset="0"/>
               </a:rPr>
-              <a:t>In PyCharm terminal die virtuelle Umgebung durch Terminal aktivieren:</a:t>
+              <a:t>Sicherstellen, dass der </a:t>
+            </a:r>
+            <a:r>
+              <a:rPr lang="en-CH" b="1" u="sng" dirty="0">
+                <a:latin typeface="Arial" panose="020B0604020202020204" pitchFamily="34" charset="0"/>
+                <a:cs typeface="Arial" panose="020B0604020202020204" pitchFamily="34" charset="0"/>
+              </a:rPr>
+              <a:t>venv</a:t>
+            </a:r>
+            <a:r>
+              <a:rPr lang="en-CH" dirty="0">
+                <a:latin typeface="Arial" panose="020B0604020202020204" pitchFamily="34" charset="0"/>
+                <a:cs typeface="Arial" panose="020B0604020202020204" pitchFamily="34" charset="0"/>
+              </a:rPr>
+              <a:t> als interpreter ausgewählt wurde:</a:t>
+            </a:r>
+            <a:br>
+              <a:rPr lang="en-CH" dirty="0">
+                <a:latin typeface="Arial" panose="020B0604020202020204" pitchFamily="34" charset="0"/>
+                <a:cs typeface="Arial" panose="020B0604020202020204" pitchFamily="34" charset="0"/>
+              </a:rPr>
+            </a:br>
+            <a:r>
+              <a:rPr lang="en-CH" dirty="0">
+                <a:latin typeface="Arial" panose="020B0604020202020204" pitchFamily="34" charset="0"/>
+                <a:cs typeface="Arial" panose="020B0604020202020204" pitchFamily="34" charset="0"/>
+              </a:rPr>
+              <a:t>PyCharm &lt; Eistellungen &lt; Python Interpreter</a:t>
             </a:r>
           </a:p>
         </p:txBody>
       </p:sp>
       <p:pic>
         <p:nvPicPr>
-          <p:cNvPr id="3" name="Picture 2">
-            <a:extLst>
-              <a:ext uri="{FF2B5EF4-FFF2-40B4-BE49-F238E27FC236}">
-                <a16:creationId xmlns:a16="http://schemas.microsoft.com/office/drawing/2014/main" id="{AF5779B0-F573-1A84-D0D7-53C35469A51D}"/>
+          <p:cNvPr id="7" name="Picture 6">
+            <a:extLst>
+              <a:ext uri="{FF2B5EF4-FFF2-40B4-BE49-F238E27FC236}">
+                <a16:creationId xmlns:a16="http://schemas.microsoft.com/office/drawing/2014/main" id="{977706C5-5C48-6055-CEE7-3E311481B004}"/>
               </a:ext>
             </a:extLst>
           </p:cNvPr>
@@ -4350,8 +4587,8 @@
         </p:blipFill>
         <p:spPr>
           <a:xfrm>
-            <a:off x="678905" y="908770"/>
-            <a:ext cx="5741823" cy="4392695"/>
+            <a:off x="715736" y="905991"/>
+            <a:ext cx="7176406" cy="1876289"/>
           </a:xfrm>
           <a:prstGeom prst="rect">
             <a:avLst/>
@@ -4360,124 +4597,10 @@
       </p:pic>
       <p:sp>
         <p:nvSpPr>
-          <p:cNvPr id="5" name="TextBox 4">
-            <a:extLst>
-              <a:ext uri="{FF2B5EF4-FFF2-40B4-BE49-F238E27FC236}">
-                <a16:creationId xmlns:a16="http://schemas.microsoft.com/office/drawing/2014/main" id="{E4112BE3-FBC2-9372-4F42-E8A15A9EB750}"/>
-              </a:ext>
-            </a:extLst>
-          </p:cNvPr>
-          <p:cNvSpPr txBox="1"/>
-          <p:nvPr/>
-        </p:nvSpPr>
-        <p:spPr>
-          <a:xfrm>
-            <a:off x="678905" y="538901"/>
-            <a:ext cx="7180825" cy="369332"/>
-          </a:xfrm>
-          <a:prstGeom prst="rect">
-            <a:avLst/>
-          </a:prstGeom>
-          <a:noFill/>
-        </p:spPr>
-        <p:txBody>
-          <a:bodyPr wrap="square" rtlCol="0">
-            <a:spAutoFit/>
-          </a:bodyPr>
-          <a:lstStyle/>
-          <a:p>
-            <a:pPr marL="342900" indent="-342900">
-              <a:buFont typeface="Arial" panose="020B0604020202020204" pitchFamily="34" charset="0"/>
-              <a:buChar char="•"/>
-            </a:pPr>
-            <a:r>
-              <a:rPr lang="en-CH" dirty="0">
-                <a:latin typeface="Arial" panose="020B0604020202020204" pitchFamily="34" charset="0"/>
-                <a:cs typeface="Arial" panose="020B0604020202020204" pitchFamily="34" charset="0"/>
-              </a:rPr>
-              <a:t>Terminal aufmachen:</a:t>
-            </a:r>
-          </a:p>
-        </p:txBody>
-      </p:sp>
-      <p:sp>
-        <p:nvSpPr>
-          <p:cNvPr id="8" name="TextBox 7">
-            <a:extLst>
-              <a:ext uri="{FF2B5EF4-FFF2-40B4-BE49-F238E27FC236}">
-                <a16:creationId xmlns:a16="http://schemas.microsoft.com/office/drawing/2014/main" id="{F6414D34-8CA1-09C8-E2E3-E5FF3B961558}"/>
-              </a:ext>
-            </a:extLst>
-          </p:cNvPr>
-          <p:cNvSpPr txBox="1"/>
-          <p:nvPr/>
-        </p:nvSpPr>
-        <p:spPr>
-          <a:xfrm>
-            <a:off x="678904" y="5418857"/>
-            <a:ext cx="7180825" cy="369332"/>
-          </a:xfrm>
-          <a:prstGeom prst="rect">
-            <a:avLst/>
-          </a:prstGeom>
-          <a:noFill/>
-        </p:spPr>
-        <p:txBody>
-          <a:bodyPr wrap="square" rtlCol="0">
-            <a:spAutoFit/>
-          </a:bodyPr>
-          <a:lstStyle/>
-          <a:p>
-            <a:pPr marL="342900" indent="-342900">
-              <a:buFont typeface="Arial" panose="020B0604020202020204" pitchFamily="34" charset="0"/>
-              <a:buChar char="•"/>
-            </a:pPr>
-            <a:r>
-              <a:rPr lang="en-CH" dirty="0">
-                <a:latin typeface="Arial" panose="020B0604020202020204" pitchFamily="34" charset="0"/>
-                <a:cs typeface="Arial" panose="020B0604020202020204" pitchFamily="34" charset="0"/>
-              </a:rPr>
-              <a:t>Sicherstellen, dass man sich im Projektornder befindet:</a:t>
-            </a:r>
-          </a:p>
-        </p:txBody>
-      </p:sp>
-      <p:pic>
-        <p:nvPicPr>
-          <p:cNvPr id="10" name="Picture 9">
-            <a:extLst>
-              <a:ext uri="{FF2B5EF4-FFF2-40B4-BE49-F238E27FC236}">
-                <a16:creationId xmlns:a16="http://schemas.microsoft.com/office/drawing/2014/main" id="{6CDD858A-0928-775E-896C-B2157A8B5F18}"/>
-              </a:ext>
-            </a:extLst>
-          </p:cNvPr>
-          <p:cNvPicPr>
-            <a:picLocks noChangeAspect="1"/>
-          </p:cNvPicPr>
-          <p:nvPr/>
-        </p:nvPicPr>
-        <p:blipFill>
-          <a:blip r:embed="rId3"/>
-          <a:stretch>
-            <a:fillRect/>
-          </a:stretch>
-        </p:blipFill>
-        <p:spPr>
-          <a:xfrm>
-            <a:off x="678904" y="5952196"/>
-            <a:ext cx="11280966" cy="469152"/>
-          </a:xfrm>
-          <a:prstGeom prst="rect">
-            <a:avLst/>
-          </a:prstGeom>
-        </p:spPr>
-      </p:pic>
-      <p:sp>
-        <p:nvSpPr>
-          <p:cNvPr id="11" name="Oval 10">
-            <a:extLst>
-              <a:ext uri="{FF2B5EF4-FFF2-40B4-BE49-F238E27FC236}">
-                <a16:creationId xmlns:a16="http://schemas.microsoft.com/office/drawing/2014/main" id="{2D0ED901-A51E-0C25-3914-BF737D94E05F}"/>
+          <p:cNvPr id="12" name="Oval 11">
+            <a:extLst>
+              <a:ext uri="{FF2B5EF4-FFF2-40B4-BE49-F238E27FC236}">
+                <a16:creationId xmlns:a16="http://schemas.microsoft.com/office/drawing/2014/main" id="{B89751DD-B312-D02C-AA59-4D3CB0632AD5}"/>
               </a:ext>
             </a:extLst>
           </p:cNvPr>
@@ -4486,7 +4609,7 @@
         </p:nvSpPr>
         <p:spPr>
           <a:xfrm>
-            <a:off x="5839880" y="5893373"/>
+            <a:off x="1719943" y="2520455"/>
             <a:ext cx="707571" cy="293399"/>
           </a:xfrm>
           <a:prstGeom prst="ellipse">
@@ -4524,12 +4647,42 @@
           </a:p>
         </p:txBody>
       </p:sp>
-      <p:sp>
-        <p:nvSpPr>
-          <p:cNvPr id="13" name="Oval 12">
-            <a:extLst>
-              <a:ext uri="{FF2B5EF4-FFF2-40B4-BE49-F238E27FC236}">
-                <a16:creationId xmlns:a16="http://schemas.microsoft.com/office/drawing/2014/main" id="{33DD9C11-943A-5A8F-7C95-4AE18B4C5437}"/>
+      <p:pic>
+        <p:nvPicPr>
+          <p:cNvPr id="15" name="Picture 14">
+            <a:extLst>
+              <a:ext uri="{FF2B5EF4-FFF2-40B4-BE49-F238E27FC236}">
+                <a16:creationId xmlns:a16="http://schemas.microsoft.com/office/drawing/2014/main" id="{06D4A4BC-38DA-C8A0-C7CE-F70C8A942219}"/>
+              </a:ext>
+            </a:extLst>
+          </p:cNvPr>
+          <p:cNvPicPr>
+            <a:picLocks noChangeAspect="1"/>
+          </p:cNvPicPr>
+          <p:nvPr/>
+        </p:nvPicPr>
+        <p:blipFill>
+          <a:blip r:embed="rId3"/>
+          <a:stretch>
+            <a:fillRect/>
+          </a:stretch>
+        </p:blipFill>
+        <p:spPr>
+          <a:xfrm>
+            <a:off x="715736" y="3322737"/>
+            <a:ext cx="8335797" cy="765923"/>
+          </a:xfrm>
+          <a:prstGeom prst="rect">
+            <a:avLst/>
+          </a:prstGeom>
+        </p:spPr>
+      </p:pic>
+      <p:sp>
+        <p:nvSpPr>
+          <p:cNvPr id="20" name="Down Arrow 19">
+            <a:extLst>
+              <a:ext uri="{FF2B5EF4-FFF2-40B4-BE49-F238E27FC236}">
+                <a16:creationId xmlns:a16="http://schemas.microsoft.com/office/drawing/2014/main" id="{6699EC53-AFF7-314C-E071-F5864057908D}"/>
               </a:ext>
             </a:extLst>
           </p:cNvPr>
@@ -4538,18 +4691,12 @@
         </p:nvSpPr>
         <p:spPr>
           <a:xfrm>
-            <a:off x="9454671" y="6070911"/>
-            <a:ext cx="2505199" cy="409260"/>
-          </a:xfrm>
-          <a:prstGeom prst="ellipse">
+            <a:off x="4541178" y="2813854"/>
+            <a:ext cx="503433" cy="435699"/>
+          </a:xfrm>
+          <a:prstGeom prst="downArrow">
             <a:avLst/>
           </a:prstGeom>
-          <a:noFill/>
-          <a:ln w="38100">
-            <a:solidFill>
-              <a:srgbClr val="FF0000"/>
-            </a:solidFill>
-          </a:ln>
         </p:spPr>
         <p:style>
           <a:lnRef idx="2">
@@ -4576,10 +4723,89 @@
           </a:p>
         </p:txBody>
       </p:sp>
+      <p:cxnSp>
+        <p:nvCxnSpPr>
+          <p:cNvPr id="22" name="Straight Arrow Connector 21">
+            <a:extLst>
+              <a:ext uri="{FF2B5EF4-FFF2-40B4-BE49-F238E27FC236}">
+                <a16:creationId xmlns:a16="http://schemas.microsoft.com/office/drawing/2014/main" id="{606D27A5-43E0-8761-11F7-E1F64EC1ACF5}"/>
+              </a:ext>
+            </a:extLst>
+          </p:cNvPr>
+          <p:cNvCxnSpPr>
+            <a:cxnSpLocks/>
+          </p:cNvCxnSpPr>
+          <p:nvPr/>
+        </p:nvCxnSpPr>
+        <p:spPr>
+          <a:xfrm flipH="1">
+            <a:off x="7169859" y="3771686"/>
+            <a:ext cx="2261817" cy="0"/>
+          </a:xfrm>
+          <a:prstGeom prst="straightConnector1">
+            <a:avLst/>
+          </a:prstGeom>
+          <a:ln w="19050">
+            <a:tailEnd type="triangle"/>
+          </a:ln>
+        </p:spPr>
+        <p:style>
+          <a:lnRef idx="1">
+            <a:schemeClr val="accent1"/>
+          </a:lnRef>
+          <a:fillRef idx="0">
+            <a:schemeClr val="accent1"/>
+          </a:fillRef>
+          <a:effectRef idx="0">
+            <a:schemeClr val="accent1"/>
+          </a:effectRef>
+          <a:fontRef idx="minor">
+            <a:schemeClr val="tx1"/>
+          </a:fontRef>
+        </p:style>
+      </p:cxnSp>
+      <p:sp>
+        <p:nvSpPr>
+          <p:cNvPr id="24" name="TextBox 23">
+            <a:extLst>
+              <a:ext uri="{FF2B5EF4-FFF2-40B4-BE49-F238E27FC236}">
+                <a16:creationId xmlns:a16="http://schemas.microsoft.com/office/drawing/2014/main" id="{CD715062-50B9-4CAE-9AEC-76A372DD4407}"/>
+              </a:ext>
+            </a:extLst>
+          </p:cNvPr>
+          <p:cNvSpPr txBox="1"/>
+          <p:nvPr/>
+        </p:nvSpPr>
+        <p:spPr>
+          <a:xfrm>
+            <a:off x="9431676" y="3428699"/>
+            <a:ext cx="2325601" cy="553998"/>
+          </a:xfrm>
+          <a:prstGeom prst="rect">
+            <a:avLst/>
+          </a:prstGeom>
+          <a:noFill/>
+        </p:spPr>
+        <p:txBody>
+          <a:bodyPr wrap="square" rtlCol="0">
+            <a:spAutoFit/>
+          </a:bodyPr>
+          <a:lstStyle/>
+          <a:p>
+            <a:r>
+              <a:rPr lang="en-CH" sz="1500" dirty="0">
+                <a:latin typeface="Arial" panose="020B0604020202020204" pitchFamily="34" charset="0"/>
+                <a:cs typeface="Arial" panose="020B0604020202020204" pitchFamily="34" charset="0"/>
+              </a:rPr>
+              <a:t>Auswählen. Der Auswahl wird nicht gespeichert.</a:t>
+            </a:r>
+          </a:p>
+        </p:txBody>
+      </p:sp>
     </p:spTree>
     <p:extLst>
       <p:ext uri="{BB962C8B-B14F-4D97-AF65-F5344CB8AC3E}">
-        <p14:creationId xmlns:p14="http://schemas.microsoft.com/office/powerpoint/2010/main" val="163343367"/>
+        <p14:creationId xmlns:p14="http://schemas.microsoft.com/office/powerpoint/2010/main" val="2425377629"/>
       </p:ext>
     </p:extLst>
   </p:cSld>
@@ -4643,17 +4869,17 @@
                 <a:latin typeface="Arial" panose="020B0604020202020204" pitchFamily="34" charset="0"/>
                 <a:cs typeface="Arial" panose="020B0604020202020204" pitchFamily="34" charset="0"/>
               </a:rPr>
-              <a:t>Folgender Befehl eingeben:</a:t>
+              <a:t>In PyCharm terminal die virtuelle Umgebung durch Terminal aktivieren:</a:t>
             </a:r>
           </a:p>
         </p:txBody>
       </p:sp>
       <p:pic>
         <p:nvPicPr>
-          <p:cNvPr id="4" name="Picture 3">
-            <a:extLst>
-              <a:ext uri="{FF2B5EF4-FFF2-40B4-BE49-F238E27FC236}">
-                <a16:creationId xmlns:a16="http://schemas.microsoft.com/office/drawing/2014/main" id="{986851A3-626A-CD8B-CD5F-447FEE6FAEEC}"/>
+          <p:cNvPr id="3" name="Picture 2">
+            <a:extLst>
+              <a:ext uri="{FF2B5EF4-FFF2-40B4-BE49-F238E27FC236}">
+                <a16:creationId xmlns:a16="http://schemas.microsoft.com/office/drawing/2014/main" id="{AF5779B0-F573-1A84-D0D7-53C35469A51D}"/>
               </a:ext>
             </a:extLst>
           </p:cNvPr>
@@ -4670,8 +4896,8 @@
         </p:blipFill>
         <p:spPr>
           <a:xfrm>
-            <a:off x="664253" y="644846"/>
-            <a:ext cx="5089275" cy="1964553"/>
+            <a:off x="678905" y="908770"/>
+            <a:ext cx="5741823" cy="4392695"/>
           </a:xfrm>
           <a:prstGeom prst="rect">
             <a:avLst/>
@@ -4680,10 +4906,10 @@
       </p:pic>
       <p:sp>
         <p:nvSpPr>
-          <p:cNvPr id="6" name="TextBox 5">
-            <a:extLst>
-              <a:ext uri="{FF2B5EF4-FFF2-40B4-BE49-F238E27FC236}">
-                <a16:creationId xmlns:a16="http://schemas.microsoft.com/office/drawing/2014/main" id="{2CFF962E-02D1-ADA3-EE99-0ED8B54EBD71}"/>
+          <p:cNvPr id="5" name="TextBox 4">
+            <a:extLst>
+              <a:ext uri="{FF2B5EF4-FFF2-40B4-BE49-F238E27FC236}">
+                <a16:creationId xmlns:a16="http://schemas.microsoft.com/office/drawing/2014/main" id="{E4112BE3-FBC2-9372-4F42-E8A15A9EB750}"/>
               </a:ext>
             </a:extLst>
           </p:cNvPr>
@@ -4692,8 +4918,8 @@
         </p:nvSpPr>
         <p:spPr>
           <a:xfrm>
-            <a:off x="304798" y="2609399"/>
-            <a:ext cx="11451771" cy="369332"/>
+            <a:off x="678905" y="538901"/>
+            <a:ext cx="7180825" cy="369332"/>
           </a:xfrm>
           <a:prstGeom prst="rect">
             <a:avLst/>
@@ -4715,17 +4941,59 @@
                 <a:latin typeface="Arial" panose="020B0604020202020204" pitchFamily="34" charset="0"/>
                 <a:cs typeface="Arial" panose="020B0604020202020204" pitchFamily="34" charset="0"/>
               </a:rPr>
-              <a:t>Terminal anschauen und sicherstellen, dass die virtuellle Umgebung aktiviert wurde:</a:t>
+              <a:t>Terminal aufmachen:</a:t>
+            </a:r>
+          </a:p>
+        </p:txBody>
+      </p:sp>
+      <p:sp>
+        <p:nvSpPr>
+          <p:cNvPr id="8" name="TextBox 7">
+            <a:extLst>
+              <a:ext uri="{FF2B5EF4-FFF2-40B4-BE49-F238E27FC236}">
+                <a16:creationId xmlns:a16="http://schemas.microsoft.com/office/drawing/2014/main" id="{F6414D34-8CA1-09C8-E2E3-E5FF3B961558}"/>
+              </a:ext>
+            </a:extLst>
+          </p:cNvPr>
+          <p:cNvSpPr txBox="1"/>
+          <p:nvPr/>
+        </p:nvSpPr>
+        <p:spPr>
+          <a:xfrm>
+            <a:off x="678904" y="5418857"/>
+            <a:ext cx="7180825" cy="369332"/>
+          </a:xfrm>
+          <a:prstGeom prst="rect">
+            <a:avLst/>
+          </a:prstGeom>
+          <a:noFill/>
+        </p:spPr>
+        <p:txBody>
+          <a:bodyPr wrap="square" rtlCol="0">
+            <a:spAutoFit/>
+          </a:bodyPr>
+          <a:lstStyle/>
+          <a:p>
+            <a:pPr marL="342900" indent="-342900">
+              <a:buFont typeface="Arial" panose="020B0604020202020204" pitchFamily="34" charset="0"/>
+              <a:buChar char="•"/>
+            </a:pPr>
+            <a:r>
+              <a:rPr lang="en-CH" dirty="0">
+                <a:latin typeface="Arial" panose="020B0604020202020204" pitchFamily="34" charset="0"/>
+                <a:cs typeface="Arial" panose="020B0604020202020204" pitchFamily="34" charset="0"/>
+              </a:rPr>
+              <a:t>Sicherstellen, dass man sich im Projektornder befindet:</a:t>
             </a:r>
           </a:p>
         </p:txBody>
       </p:sp>
       <p:pic>
         <p:nvPicPr>
-          <p:cNvPr id="9" name="Picture 8">
-            <a:extLst>
-              <a:ext uri="{FF2B5EF4-FFF2-40B4-BE49-F238E27FC236}">
-                <a16:creationId xmlns:a16="http://schemas.microsoft.com/office/drawing/2014/main" id="{32DE2AB3-3CC7-6DB2-A239-6262E43C63DB}"/>
+          <p:cNvPr id="10" name="Picture 9">
+            <a:extLst>
+              <a:ext uri="{FF2B5EF4-FFF2-40B4-BE49-F238E27FC236}">
+                <a16:creationId xmlns:a16="http://schemas.microsoft.com/office/drawing/2014/main" id="{6CDD858A-0928-775E-896C-B2157A8B5F18}"/>
               </a:ext>
             </a:extLst>
           </p:cNvPr>
@@ -4742,8 +5010,8 @@
         </p:blipFill>
         <p:spPr>
           <a:xfrm>
-            <a:off x="922891" y="3117137"/>
-            <a:ext cx="6227922" cy="787680"/>
+            <a:off x="678904" y="5952196"/>
+            <a:ext cx="11280966" cy="469152"/>
           </a:xfrm>
           <a:prstGeom prst="rect">
             <a:avLst/>
@@ -4752,10 +5020,10 @@
       </p:pic>
       <p:sp>
         <p:nvSpPr>
-          <p:cNvPr id="12" name="Oval 11">
-            <a:extLst>
-              <a:ext uri="{FF2B5EF4-FFF2-40B4-BE49-F238E27FC236}">
-                <a16:creationId xmlns:a16="http://schemas.microsoft.com/office/drawing/2014/main" id="{30AD59F6-6A41-BE81-9754-142B34DBCAE5}"/>
+          <p:cNvPr id="11" name="Oval 10">
+            <a:extLst>
+              <a:ext uri="{FF2B5EF4-FFF2-40B4-BE49-F238E27FC236}">
+                <a16:creationId xmlns:a16="http://schemas.microsoft.com/office/drawing/2014/main" id="{2D0ED901-A51E-0C25-3914-BF737D94E05F}"/>
               </a:ext>
             </a:extLst>
           </p:cNvPr>
@@ -4764,7 +5032,7 @@
         </p:nvSpPr>
         <p:spPr>
           <a:xfrm>
-            <a:off x="922891" y="3449548"/>
+            <a:off x="5839880" y="5893373"/>
             <a:ext cx="707571" cy="293399"/>
           </a:xfrm>
           <a:prstGeom prst="ellipse">
@@ -4804,110 +5072,10 @@
       </p:sp>
       <p:sp>
         <p:nvSpPr>
-          <p:cNvPr id="14" name="TextBox 13">
-            <a:extLst>
-              <a:ext uri="{FF2B5EF4-FFF2-40B4-BE49-F238E27FC236}">
-                <a16:creationId xmlns:a16="http://schemas.microsoft.com/office/drawing/2014/main" id="{06F29FBE-9E8D-C3DB-F97E-8031AB055B77}"/>
-              </a:ext>
-            </a:extLst>
-          </p:cNvPr>
-          <p:cNvSpPr txBox="1"/>
-          <p:nvPr/>
-        </p:nvSpPr>
-        <p:spPr>
-          <a:xfrm>
-            <a:off x="304797" y="4039104"/>
-            <a:ext cx="11451771" cy="369332"/>
-          </a:xfrm>
-          <a:prstGeom prst="rect">
-            <a:avLst/>
-          </a:prstGeom>
-          <a:noFill/>
-        </p:spPr>
-        <p:txBody>
-          <a:bodyPr wrap="square" rtlCol="0">
-            <a:spAutoFit/>
-          </a:bodyPr>
-          <a:lstStyle/>
-          <a:p>
-            <a:pPr marL="342900" indent="-342900">
-              <a:buFont typeface="Arial" panose="020B0604020202020204" pitchFamily="34" charset="0"/>
-              <a:buChar char="•"/>
-            </a:pPr>
-            <a:r>
-              <a:rPr lang="en-CH" dirty="0">
-                <a:latin typeface="Arial" panose="020B0604020202020204" pitchFamily="34" charset="0"/>
-                <a:cs typeface="Arial" panose="020B0604020202020204" pitchFamily="34" charset="0"/>
-              </a:rPr>
-              <a:t>Jetzt </a:t>
-            </a:r>
-            <a:r>
-              <a:rPr lang="en-CH" i="1" dirty="0">
-                <a:latin typeface="Arial" panose="020B0604020202020204" pitchFamily="34" charset="0"/>
-                <a:cs typeface="Arial" panose="020B0604020202020204" pitchFamily="34" charset="0"/>
-              </a:rPr>
-              <a:t>pip install –r requirements.txt</a:t>
-            </a:r>
-            <a:r>
-              <a:rPr lang="en-CH" dirty="0">
-                <a:latin typeface="Arial" panose="020B0604020202020204" pitchFamily="34" charset="0"/>
-                <a:cs typeface="Arial" panose="020B0604020202020204" pitchFamily="34" charset="0"/>
-              </a:rPr>
-              <a:t> aufrufen, </a:t>
-            </a:r>
-            <a:r>
-              <a:rPr lang="en-CH" b="1" dirty="0">
-                <a:latin typeface="Arial" panose="020B0604020202020204" pitchFamily="34" charset="0"/>
-                <a:cs typeface="Arial" panose="020B0604020202020204" pitchFamily="34" charset="0"/>
-              </a:rPr>
-              <a:t>aber von der pip-installer der virtuellen Umgebung</a:t>
-            </a:r>
-            <a:r>
-              <a:rPr lang="en-CH" dirty="0">
-                <a:latin typeface="Arial" panose="020B0604020202020204" pitchFamily="34" charset="0"/>
-                <a:cs typeface="Arial" panose="020B0604020202020204" pitchFamily="34" charset="0"/>
-              </a:rPr>
-              <a:t>:</a:t>
-            </a:r>
-          </a:p>
-        </p:txBody>
-      </p:sp>
-      <p:pic>
-        <p:nvPicPr>
-          <p:cNvPr id="17" name="Picture 16">
-            <a:extLst>
-              <a:ext uri="{FF2B5EF4-FFF2-40B4-BE49-F238E27FC236}">
-                <a16:creationId xmlns:a16="http://schemas.microsoft.com/office/drawing/2014/main" id="{2B14864A-6F7F-122F-22F1-DF5A341C3C76}"/>
-              </a:ext>
-            </a:extLst>
-          </p:cNvPr>
-          <p:cNvPicPr>
-            <a:picLocks noChangeAspect="1"/>
-          </p:cNvPicPr>
-          <p:nvPr/>
-        </p:nvPicPr>
-        <p:blipFill>
-          <a:blip r:embed="rId4"/>
-          <a:stretch>
-            <a:fillRect/>
-          </a:stretch>
-        </p:blipFill>
-        <p:spPr>
-          <a:xfrm>
-            <a:off x="922891" y="4518436"/>
-            <a:ext cx="10611636" cy="642457"/>
-          </a:xfrm>
-          <a:prstGeom prst="rect">
-            <a:avLst/>
-          </a:prstGeom>
-        </p:spPr>
-      </p:pic>
-      <p:sp>
-        <p:nvSpPr>
-          <p:cNvPr id="18" name="Oval 17">
-            <a:extLst>
-              <a:ext uri="{FF2B5EF4-FFF2-40B4-BE49-F238E27FC236}">
-                <a16:creationId xmlns:a16="http://schemas.microsoft.com/office/drawing/2014/main" id="{2766BD86-64F3-7559-D19F-7FB07002B34E}"/>
+          <p:cNvPr id="13" name="Oval 12">
+            <a:extLst>
+              <a:ext uri="{FF2B5EF4-FFF2-40B4-BE49-F238E27FC236}">
+                <a16:creationId xmlns:a16="http://schemas.microsoft.com/office/drawing/2014/main" id="{33DD9C11-943A-5A8F-7C95-4AE18B4C5437}"/>
               </a:ext>
             </a:extLst>
           </p:cNvPr>
@@ -4916,8 +5084,8 @@
         </p:nvSpPr>
         <p:spPr>
           <a:xfrm>
-            <a:off x="7233007" y="4729664"/>
-            <a:ext cx="1345914" cy="541229"/>
+            <a:off x="9454671" y="6070911"/>
+            <a:ext cx="2505199" cy="409260"/>
           </a:xfrm>
           <a:prstGeom prst="ellipse">
             <a:avLst/>
@@ -4954,201 +5122,10 @@
           </a:p>
         </p:txBody>
       </p:sp>
-      <p:sp>
-        <p:nvSpPr>
-          <p:cNvPr id="20" name="TextBox 19">
-            <a:extLst>
-              <a:ext uri="{FF2B5EF4-FFF2-40B4-BE49-F238E27FC236}">
-                <a16:creationId xmlns:a16="http://schemas.microsoft.com/office/drawing/2014/main" id="{85B3A050-DFB1-286F-84AD-AE03C9035DE8}"/>
-              </a:ext>
-            </a:extLst>
-          </p:cNvPr>
-          <p:cNvSpPr txBox="1"/>
-          <p:nvPr/>
-        </p:nvSpPr>
-        <p:spPr>
-          <a:xfrm>
-            <a:off x="894096" y="5291441"/>
-            <a:ext cx="4859432" cy="276999"/>
-          </a:xfrm>
-          <a:prstGeom prst="rect">
-            <a:avLst/>
-          </a:prstGeom>
-          <a:noFill/>
-        </p:spPr>
-        <p:txBody>
-          <a:bodyPr wrap="square" rtlCol="0">
-            <a:spAutoFit/>
-          </a:bodyPr>
-          <a:lstStyle/>
-          <a:p>
-            <a:r>
-              <a:rPr lang="en-CH" sz="1200" i="1" dirty="0">
-                <a:latin typeface="Arial" panose="020B0604020202020204" pitchFamily="34" charset="0"/>
-                <a:cs typeface="Arial" panose="020B0604020202020204" pitchFamily="34" charset="0"/>
-              </a:rPr>
-              <a:t>requirements.txt</a:t>
-            </a:r>
-            <a:r>
-              <a:rPr lang="en-CH" sz="1200" dirty="0">
-                <a:latin typeface="Arial" panose="020B0604020202020204" pitchFamily="34" charset="0"/>
-                <a:cs typeface="Arial" panose="020B0604020202020204" pitchFamily="34" charset="0"/>
-              </a:rPr>
-              <a:t> beinhaltet alle fürs Projekt notwendigen Packages:</a:t>
-            </a:r>
-          </a:p>
-        </p:txBody>
-      </p:sp>
-      <p:pic>
-        <p:nvPicPr>
-          <p:cNvPr id="22" name="Picture 21">
-            <a:extLst>
-              <a:ext uri="{FF2B5EF4-FFF2-40B4-BE49-F238E27FC236}">
-                <a16:creationId xmlns:a16="http://schemas.microsoft.com/office/drawing/2014/main" id="{CF5E3D99-ED9E-AA52-A808-87F3813401E2}"/>
-              </a:ext>
-            </a:extLst>
-          </p:cNvPr>
-          <p:cNvPicPr>
-            <a:picLocks noChangeAspect="1"/>
-          </p:cNvPicPr>
-          <p:nvPr/>
-        </p:nvPicPr>
-        <p:blipFill>
-          <a:blip r:embed="rId5"/>
-          <a:stretch>
-            <a:fillRect/>
-          </a:stretch>
-        </p:blipFill>
-        <p:spPr>
-          <a:xfrm>
-            <a:off x="5565954" y="5356372"/>
-            <a:ext cx="2160213" cy="1427109"/>
-          </a:xfrm>
-          <a:prstGeom prst="rect">
-            <a:avLst/>
-          </a:prstGeom>
-        </p:spPr>
-      </p:pic>
-      <p:cxnSp>
-        <p:nvCxnSpPr>
-          <p:cNvPr id="23" name="Straight Arrow Connector 22">
-            <a:extLst>
-              <a:ext uri="{FF2B5EF4-FFF2-40B4-BE49-F238E27FC236}">
-                <a16:creationId xmlns:a16="http://schemas.microsoft.com/office/drawing/2014/main" id="{91A7800E-9869-0CFA-1C81-E7C8CCE57E87}"/>
-              </a:ext>
-            </a:extLst>
-          </p:cNvPr>
-          <p:cNvCxnSpPr>
-            <a:cxnSpLocks/>
-          </p:cNvCxnSpPr>
-          <p:nvPr/>
-        </p:nvCxnSpPr>
-        <p:spPr>
-          <a:xfrm flipH="1" flipV="1">
-            <a:off x="8311793" y="5270893"/>
-            <a:ext cx="409291" cy="297547"/>
-          </a:xfrm>
-          <a:prstGeom prst="straightConnector1">
-            <a:avLst/>
-          </a:prstGeom>
-          <a:ln w="19050">
-            <a:tailEnd type="triangle"/>
-          </a:ln>
-        </p:spPr>
-        <p:style>
-          <a:lnRef idx="1">
-            <a:schemeClr val="accent1"/>
-          </a:lnRef>
-          <a:fillRef idx="0">
-            <a:schemeClr val="accent1"/>
-          </a:fillRef>
-          <a:effectRef idx="0">
-            <a:schemeClr val="accent1"/>
-          </a:effectRef>
-          <a:fontRef idx="minor">
-            <a:schemeClr val="tx1"/>
-          </a:fontRef>
-        </p:style>
-      </p:cxnSp>
-      <p:sp>
-        <p:nvSpPr>
-          <p:cNvPr id="28" name="TextBox 27">
-            <a:extLst>
-              <a:ext uri="{FF2B5EF4-FFF2-40B4-BE49-F238E27FC236}">
-                <a16:creationId xmlns:a16="http://schemas.microsoft.com/office/drawing/2014/main" id="{C08B0663-9991-A389-5792-21F98360E9CB}"/>
-              </a:ext>
-            </a:extLst>
-          </p:cNvPr>
-          <p:cNvSpPr txBox="1"/>
-          <p:nvPr/>
-        </p:nvSpPr>
-        <p:spPr>
-          <a:xfrm>
-            <a:off x="8578921" y="5568440"/>
-            <a:ext cx="3452117" cy="523220"/>
-          </a:xfrm>
-          <a:prstGeom prst="rect">
-            <a:avLst/>
-          </a:prstGeom>
-          <a:noFill/>
-          <a:ln>
-            <a:solidFill>
-              <a:schemeClr val="accent1"/>
-            </a:solidFill>
-          </a:ln>
-        </p:spPr>
-        <p:txBody>
-          <a:bodyPr wrap="square" rtlCol="0">
-            <a:spAutoFit/>
-          </a:bodyPr>
-          <a:lstStyle/>
-          <a:p>
-            <a:r>
-              <a:rPr lang="en-CH" sz="1400" dirty="0">
-                <a:latin typeface="Arial" panose="020B0604020202020204" pitchFamily="34" charset="0"/>
-                <a:cs typeface="Arial" panose="020B0604020202020204" pitchFamily="34" charset="0"/>
-              </a:rPr>
-              <a:t>use </a:t>
-            </a:r>
-            <a:r>
-              <a:rPr lang="en-GB" sz="1400" b="1" i="1" dirty="0">
-                <a:latin typeface="Arial" panose="020B0604020202020204" pitchFamily="34" charset="0"/>
-                <a:cs typeface="Arial" panose="020B0604020202020204" pitchFamily="34" charset="0"/>
-              </a:rPr>
-              <a:t>./</a:t>
-            </a:r>
-            <a:r>
-              <a:rPr lang="en-GB" sz="1400" b="1" i="1" dirty="0" err="1">
-                <a:latin typeface="Arial" panose="020B0604020202020204" pitchFamily="34" charset="0"/>
-                <a:cs typeface="Arial" panose="020B0604020202020204" pitchFamily="34" charset="0"/>
-              </a:rPr>
-              <a:t>venv</a:t>
-            </a:r>
-            <a:r>
-              <a:rPr lang="en-GB" sz="1400" b="1" i="1" dirty="0">
-                <a:latin typeface="Arial" panose="020B0604020202020204" pitchFamily="34" charset="0"/>
-                <a:cs typeface="Arial" panose="020B0604020202020204" pitchFamily="34" charset="0"/>
-              </a:rPr>
-              <a:t>/bin/pip install --upgrade pip</a:t>
-            </a:r>
-            <a:r>
-              <a:rPr lang="en-CH" sz="1400" dirty="0">
-                <a:latin typeface="Arial" panose="020B0604020202020204" pitchFamily="34" charset="0"/>
-                <a:cs typeface="Arial" panose="020B0604020202020204" pitchFamily="34" charset="0"/>
-              </a:rPr>
-              <a:t> to ensure latest pip version!</a:t>
-            </a:r>
-            <a:endParaRPr lang="en-GB" sz="1400" dirty="0">
-              <a:latin typeface="Arial" panose="020B0604020202020204" pitchFamily="34" charset="0"/>
-              <a:cs typeface="Arial" panose="020B0604020202020204" pitchFamily="34" charset="0"/>
-            </a:endParaRPr>
-          </a:p>
-        </p:txBody>
-      </p:sp>
     </p:spTree>
     <p:extLst>
       <p:ext uri="{BB962C8B-B14F-4D97-AF65-F5344CB8AC3E}">
-        <p14:creationId xmlns:p14="http://schemas.microsoft.com/office/powerpoint/2010/main" val="3061928575"/>
+        <p14:creationId xmlns:p14="http://schemas.microsoft.com/office/powerpoint/2010/main" val="163343367"/>
       </p:ext>
     </p:extLst>
   </p:cSld>
@@ -5190,7 +5167,7 @@
         <p:spPr>
           <a:xfrm>
             <a:off x="304799" y="169569"/>
-            <a:ext cx="11451771" cy="646331"/>
+            <a:ext cx="11451771" cy="369332"/>
           </a:xfrm>
           <a:prstGeom prst="rect">
             <a:avLst/>
@@ -5212,30 +5189,17 @@
                 <a:latin typeface="Arial" panose="020B0604020202020204" pitchFamily="34" charset="0"/>
                 <a:cs typeface="Arial" panose="020B0604020202020204" pitchFamily="34" charset="0"/>
               </a:rPr>
-              <a:t>Überprüfen, dass alle packages in die virtuelle Umgebung installiert und vorhanden sind:</a:t>
-            </a:r>
-            <a:br>
-              <a:rPr lang="en-CH" dirty="0">
-                <a:latin typeface="Arial" panose="020B0604020202020204" pitchFamily="34" charset="0"/>
-                <a:cs typeface="Arial" panose="020B0604020202020204" pitchFamily="34" charset="0"/>
-              </a:rPr>
-            </a:br>
-            <a:r>
-              <a:rPr lang="en-CH" dirty="0">
-                <a:latin typeface="Arial" panose="020B0604020202020204" pitchFamily="34" charset="0"/>
-                <a:cs typeface="Arial" panose="020B0604020202020204" pitchFamily="34" charset="0"/>
-              </a:rPr>
-              <a:t>PyCharm &lt; Eistellungen &lt; Python Interpreter</a:t>
+              <a:t>Folgender Befehl eingeben:</a:t>
             </a:r>
           </a:p>
         </p:txBody>
       </p:sp>
       <p:pic>
         <p:nvPicPr>
-          <p:cNvPr id="5" name="Picture 4">
-            <a:extLst>
-              <a:ext uri="{FF2B5EF4-FFF2-40B4-BE49-F238E27FC236}">
-                <a16:creationId xmlns:a16="http://schemas.microsoft.com/office/drawing/2014/main" id="{CB1DC553-33D4-FE8F-E6B7-77F50E1A55F4}"/>
+          <p:cNvPr id="4" name="Picture 3">
+            <a:extLst>
+              <a:ext uri="{FF2B5EF4-FFF2-40B4-BE49-F238E27FC236}">
+                <a16:creationId xmlns:a16="http://schemas.microsoft.com/office/drawing/2014/main" id="{986851A3-626A-CD8B-CD5F-447FEE6FAEEC}"/>
               </a:ext>
             </a:extLst>
           </p:cNvPr>
@@ -5252,8 +5216,8 @@
         </p:blipFill>
         <p:spPr>
           <a:xfrm>
-            <a:off x="765764" y="965770"/>
-            <a:ext cx="5624762" cy="3756029"/>
+            <a:off x="664253" y="644846"/>
+            <a:ext cx="5089275" cy="1964553"/>
           </a:xfrm>
           <a:prstGeom prst="rect">
             <a:avLst/>
@@ -5262,10 +5226,82 @@
       </p:pic>
       <p:sp>
         <p:nvSpPr>
-          <p:cNvPr id="7" name="Oval 6">
-            <a:extLst>
-              <a:ext uri="{FF2B5EF4-FFF2-40B4-BE49-F238E27FC236}">
-                <a16:creationId xmlns:a16="http://schemas.microsoft.com/office/drawing/2014/main" id="{8A8984FF-C8D2-C9A2-6866-E372E157E5EE}"/>
+          <p:cNvPr id="6" name="TextBox 5">
+            <a:extLst>
+              <a:ext uri="{FF2B5EF4-FFF2-40B4-BE49-F238E27FC236}">
+                <a16:creationId xmlns:a16="http://schemas.microsoft.com/office/drawing/2014/main" id="{2CFF962E-02D1-ADA3-EE99-0ED8B54EBD71}"/>
+              </a:ext>
+            </a:extLst>
+          </p:cNvPr>
+          <p:cNvSpPr txBox="1"/>
+          <p:nvPr/>
+        </p:nvSpPr>
+        <p:spPr>
+          <a:xfrm>
+            <a:off x="304798" y="2609399"/>
+            <a:ext cx="11451771" cy="369332"/>
+          </a:xfrm>
+          <a:prstGeom prst="rect">
+            <a:avLst/>
+          </a:prstGeom>
+          <a:noFill/>
+        </p:spPr>
+        <p:txBody>
+          <a:bodyPr wrap="square" rtlCol="0">
+            <a:spAutoFit/>
+          </a:bodyPr>
+          <a:lstStyle/>
+          <a:p>
+            <a:pPr marL="342900" indent="-342900">
+              <a:buFont typeface="Arial" panose="020B0604020202020204" pitchFamily="34" charset="0"/>
+              <a:buChar char="•"/>
+            </a:pPr>
+            <a:r>
+              <a:rPr lang="en-CH" dirty="0">
+                <a:latin typeface="Arial" panose="020B0604020202020204" pitchFamily="34" charset="0"/>
+                <a:cs typeface="Arial" panose="020B0604020202020204" pitchFamily="34" charset="0"/>
+              </a:rPr>
+              <a:t>Terminal anschauen und sicherstellen, dass die virtuellle Umgebung aktiviert wurde:</a:t>
+            </a:r>
+          </a:p>
+        </p:txBody>
+      </p:sp>
+      <p:pic>
+        <p:nvPicPr>
+          <p:cNvPr id="9" name="Picture 8">
+            <a:extLst>
+              <a:ext uri="{FF2B5EF4-FFF2-40B4-BE49-F238E27FC236}">
+                <a16:creationId xmlns:a16="http://schemas.microsoft.com/office/drawing/2014/main" id="{32DE2AB3-3CC7-6DB2-A239-6262E43C63DB}"/>
+              </a:ext>
+            </a:extLst>
+          </p:cNvPr>
+          <p:cNvPicPr>
+            <a:picLocks noChangeAspect="1"/>
+          </p:cNvPicPr>
+          <p:nvPr/>
+        </p:nvPicPr>
+        <p:blipFill>
+          <a:blip r:embed="rId3"/>
+          <a:stretch>
+            <a:fillRect/>
+          </a:stretch>
+        </p:blipFill>
+        <p:spPr>
+          <a:xfrm>
+            <a:off x="922891" y="3117137"/>
+            <a:ext cx="6227922" cy="787680"/>
+          </a:xfrm>
+          <a:prstGeom prst="rect">
+            <a:avLst/>
+          </a:prstGeom>
+        </p:spPr>
+      </p:pic>
+      <p:sp>
+        <p:nvSpPr>
+          <p:cNvPr id="12" name="Oval 11">
+            <a:extLst>
+              <a:ext uri="{FF2B5EF4-FFF2-40B4-BE49-F238E27FC236}">
+                <a16:creationId xmlns:a16="http://schemas.microsoft.com/office/drawing/2014/main" id="{30AD59F6-6A41-BE81-9754-142B34DBCAE5}"/>
               </a:ext>
             </a:extLst>
           </p:cNvPr>
@@ -5274,8 +5310,8 @@
         </p:nvSpPr>
         <p:spPr>
           <a:xfrm>
-            <a:off x="765764" y="774783"/>
-            <a:ext cx="1345914" cy="541229"/>
+            <a:off x="922891" y="3449548"/>
+            <a:ext cx="707571" cy="293399"/>
           </a:xfrm>
           <a:prstGeom prst="ellipse">
             <a:avLst/>
@@ -5314,10 +5350,110 @@
       </p:sp>
       <p:sp>
         <p:nvSpPr>
-          <p:cNvPr id="8" name="Oval 7">
-            <a:extLst>
-              <a:ext uri="{FF2B5EF4-FFF2-40B4-BE49-F238E27FC236}">
-                <a16:creationId xmlns:a16="http://schemas.microsoft.com/office/drawing/2014/main" id="{F61BE801-033E-7761-1E9D-85CFA2CCD26D}"/>
+          <p:cNvPr id="14" name="TextBox 13">
+            <a:extLst>
+              <a:ext uri="{FF2B5EF4-FFF2-40B4-BE49-F238E27FC236}">
+                <a16:creationId xmlns:a16="http://schemas.microsoft.com/office/drawing/2014/main" id="{06F29FBE-9E8D-C3DB-F97E-8031AB055B77}"/>
+              </a:ext>
+            </a:extLst>
+          </p:cNvPr>
+          <p:cNvSpPr txBox="1"/>
+          <p:nvPr/>
+        </p:nvSpPr>
+        <p:spPr>
+          <a:xfrm>
+            <a:off x="304797" y="4039104"/>
+            <a:ext cx="11451771" cy="369332"/>
+          </a:xfrm>
+          <a:prstGeom prst="rect">
+            <a:avLst/>
+          </a:prstGeom>
+          <a:noFill/>
+        </p:spPr>
+        <p:txBody>
+          <a:bodyPr wrap="square" rtlCol="0">
+            <a:spAutoFit/>
+          </a:bodyPr>
+          <a:lstStyle/>
+          <a:p>
+            <a:pPr marL="342900" indent="-342900">
+              <a:buFont typeface="Arial" panose="020B0604020202020204" pitchFamily="34" charset="0"/>
+              <a:buChar char="•"/>
+            </a:pPr>
+            <a:r>
+              <a:rPr lang="en-CH" dirty="0">
+                <a:latin typeface="Arial" panose="020B0604020202020204" pitchFamily="34" charset="0"/>
+                <a:cs typeface="Arial" panose="020B0604020202020204" pitchFamily="34" charset="0"/>
+              </a:rPr>
+              <a:t>Jetzt </a:t>
+            </a:r>
+            <a:r>
+              <a:rPr lang="en-CH" i="1" dirty="0">
+                <a:latin typeface="Arial" panose="020B0604020202020204" pitchFamily="34" charset="0"/>
+                <a:cs typeface="Arial" panose="020B0604020202020204" pitchFamily="34" charset="0"/>
+              </a:rPr>
+              <a:t>pip install –r requirements.txt</a:t>
+            </a:r>
+            <a:r>
+              <a:rPr lang="en-CH" dirty="0">
+                <a:latin typeface="Arial" panose="020B0604020202020204" pitchFamily="34" charset="0"/>
+                <a:cs typeface="Arial" panose="020B0604020202020204" pitchFamily="34" charset="0"/>
+              </a:rPr>
+              <a:t> aufrufen, </a:t>
+            </a:r>
+            <a:r>
+              <a:rPr lang="en-CH" b="1" dirty="0">
+                <a:latin typeface="Arial" panose="020B0604020202020204" pitchFamily="34" charset="0"/>
+                <a:cs typeface="Arial" panose="020B0604020202020204" pitchFamily="34" charset="0"/>
+              </a:rPr>
+              <a:t>aber von der pip-installer der virtuellen Umgebung</a:t>
+            </a:r>
+            <a:r>
+              <a:rPr lang="en-CH" dirty="0">
+                <a:latin typeface="Arial" panose="020B0604020202020204" pitchFamily="34" charset="0"/>
+                <a:cs typeface="Arial" panose="020B0604020202020204" pitchFamily="34" charset="0"/>
+              </a:rPr>
+              <a:t>:</a:t>
+            </a:r>
+          </a:p>
+        </p:txBody>
+      </p:sp>
+      <p:pic>
+        <p:nvPicPr>
+          <p:cNvPr id="17" name="Picture 16">
+            <a:extLst>
+              <a:ext uri="{FF2B5EF4-FFF2-40B4-BE49-F238E27FC236}">
+                <a16:creationId xmlns:a16="http://schemas.microsoft.com/office/drawing/2014/main" id="{2B14864A-6F7F-122F-22F1-DF5A341C3C76}"/>
+              </a:ext>
+            </a:extLst>
+          </p:cNvPr>
+          <p:cNvPicPr>
+            <a:picLocks noChangeAspect="1"/>
+          </p:cNvPicPr>
+          <p:nvPr/>
+        </p:nvPicPr>
+        <p:blipFill>
+          <a:blip r:embed="rId4"/>
+          <a:stretch>
+            <a:fillRect/>
+          </a:stretch>
+        </p:blipFill>
+        <p:spPr>
+          <a:xfrm>
+            <a:off x="922891" y="4518436"/>
+            <a:ext cx="10611636" cy="642457"/>
+          </a:xfrm>
+          <a:prstGeom prst="rect">
+            <a:avLst/>
+          </a:prstGeom>
+        </p:spPr>
+      </p:pic>
+      <p:sp>
+        <p:nvSpPr>
+          <p:cNvPr id="18" name="Oval 17">
+            <a:extLst>
+              <a:ext uri="{FF2B5EF4-FFF2-40B4-BE49-F238E27FC236}">
+                <a16:creationId xmlns:a16="http://schemas.microsoft.com/office/drawing/2014/main" id="{2766BD86-64F3-7559-D19F-7FB07002B34E}"/>
               </a:ext>
             </a:extLst>
           </p:cNvPr>
@@ -5326,7 +5462,7 @@
         </p:nvSpPr>
         <p:spPr>
           <a:xfrm>
-            <a:off x="2111678" y="1150499"/>
+            <a:off x="7233007" y="4729664"/>
             <a:ext cx="1345914" cy="541229"/>
           </a:xfrm>
           <a:prstGeom prst="ellipse">
@@ -5366,62 +5502,125 @@
       </p:sp>
       <p:sp>
         <p:nvSpPr>
-          <p:cNvPr id="10" name="Oval 9">
-            <a:extLst>
-              <a:ext uri="{FF2B5EF4-FFF2-40B4-BE49-F238E27FC236}">
-                <a16:creationId xmlns:a16="http://schemas.microsoft.com/office/drawing/2014/main" id="{986221C9-A6F6-C067-DA5D-823F1D4A4087}"/>
-              </a:ext>
-            </a:extLst>
-          </p:cNvPr>
-          <p:cNvSpPr/>
+          <p:cNvPr id="20" name="TextBox 19">
+            <a:extLst>
+              <a:ext uri="{FF2B5EF4-FFF2-40B4-BE49-F238E27FC236}">
+                <a16:creationId xmlns:a16="http://schemas.microsoft.com/office/drawing/2014/main" id="{85B3A050-DFB1-286F-84AD-AE03C9035DE8}"/>
+              </a:ext>
+            </a:extLst>
+          </p:cNvPr>
+          <p:cNvSpPr txBox="1"/>
           <p:nvPr/>
         </p:nvSpPr>
         <p:spPr>
           <a:xfrm>
-            <a:off x="635284" y="4510355"/>
-            <a:ext cx="751727" cy="253456"/>
-          </a:xfrm>
-          <a:prstGeom prst="ellipse">
+            <a:off x="894096" y="5291441"/>
+            <a:ext cx="4859432" cy="276999"/>
+          </a:xfrm>
+          <a:prstGeom prst="rect">
             <a:avLst/>
           </a:prstGeom>
           <a:noFill/>
-          <a:ln w="38100">
-            <a:solidFill>
-              <a:srgbClr val="FF0000"/>
-            </a:solidFill>
+        </p:spPr>
+        <p:txBody>
+          <a:bodyPr wrap="square" rtlCol="0">
+            <a:spAutoFit/>
+          </a:bodyPr>
+          <a:lstStyle/>
+          <a:p>
+            <a:r>
+              <a:rPr lang="en-CH" sz="1200" i="1" dirty="0">
+                <a:latin typeface="Arial" panose="020B0604020202020204" pitchFamily="34" charset="0"/>
+                <a:cs typeface="Arial" panose="020B0604020202020204" pitchFamily="34" charset="0"/>
+              </a:rPr>
+              <a:t>requirements.txt</a:t>
+            </a:r>
+            <a:r>
+              <a:rPr lang="en-CH" sz="1200" dirty="0">
+                <a:latin typeface="Arial" panose="020B0604020202020204" pitchFamily="34" charset="0"/>
+                <a:cs typeface="Arial" panose="020B0604020202020204" pitchFamily="34" charset="0"/>
+              </a:rPr>
+              <a:t> beinhaltet alle fürs Projekt notwendigen Packages:</a:t>
+            </a:r>
+          </a:p>
+        </p:txBody>
+      </p:sp>
+      <p:pic>
+        <p:nvPicPr>
+          <p:cNvPr id="22" name="Picture 21">
+            <a:extLst>
+              <a:ext uri="{FF2B5EF4-FFF2-40B4-BE49-F238E27FC236}">
+                <a16:creationId xmlns:a16="http://schemas.microsoft.com/office/drawing/2014/main" id="{CF5E3D99-ED9E-AA52-A808-87F3813401E2}"/>
+              </a:ext>
+            </a:extLst>
+          </p:cNvPr>
+          <p:cNvPicPr>
+            <a:picLocks noChangeAspect="1"/>
+          </p:cNvPicPr>
+          <p:nvPr/>
+        </p:nvPicPr>
+        <p:blipFill>
+          <a:blip r:embed="rId5"/>
+          <a:srcRect/>
+          <a:stretch/>
+        </p:blipFill>
+        <p:spPr>
+          <a:xfrm>
+            <a:off x="5700861" y="5270893"/>
+            <a:ext cx="1475226" cy="1546445"/>
+          </a:xfrm>
+          <a:prstGeom prst="rect">
+            <a:avLst/>
+          </a:prstGeom>
+        </p:spPr>
+      </p:pic>
+      <p:cxnSp>
+        <p:nvCxnSpPr>
+          <p:cNvPr id="23" name="Straight Arrow Connector 22">
+            <a:extLst>
+              <a:ext uri="{FF2B5EF4-FFF2-40B4-BE49-F238E27FC236}">
+                <a16:creationId xmlns:a16="http://schemas.microsoft.com/office/drawing/2014/main" id="{91A7800E-9869-0CFA-1C81-E7C8CCE57E87}"/>
+              </a:ext>
+            </a:extLst>
+          </p:cNvPr>
+          <p:cNvCxnSpPr>
+            <a:cxnSpLocks/>
+          </p:cNvCxnSpPr>
+          <p:nvPr/>
+        </p:nvCxnSpPr>
+        <p:spPr>
+          <a:xfrm flipH="1" flipV="1">
+            <a:off x="8311793" y="5270893"/>
+            <a:ext cx="409291" cy="297547"/>
+          </a:xfrm>
+          <a:prstGeom prst="straightConnector1">
+            <a:avLst/>
+          </a:prstGeom>
+          <a:ln w="19050">
+            <a:tailEnd type="triangle"/>
           </a:ln>
         </p:spPr>
         <p:style>
-          <a:lnRef idx="2">
-            <a:schemeClr val="accent1">
-              <a:shade val="15000"/>
-            </a:schemeClr>
+          <a:lnRef idx="1">
+            <a:schemeClr val="accent1"/>
           </a:lnRef>
-          <a:fillRef idx="1">
+          <a:fillRef idx="0">
             <a:schemeClr val="accent1"/>
           </a:fillRef>
           <a:effectRef idx="0">
             <a:schemeClr val="accent1"/>
           </a:effectRef>
           <a:fontRef idx="minor">
-            <a:schemeClr val="lt1"/>
+            <a:schemeClr val="tx1"/>
           </a:fontRef>
         </p:style>
-        <p:txBody>
-          <a:bodyPr rtlCol="0" anchor="ctr"/>
-          <a:lstStyle/>
-          <a:p>
-            <a:pPr algn="ctr"/>
-            <a:endParaRPr lang="en-CH"/>
-          </a:p>
-        </p:txBody>
-      </p:sp>
-      <p:sp>
-        <p:nvSpPr>
-          <p:cNvPr id="11" name="TextBox 10">
-            <a:extLst>
-              <a:ext uri="{FF2B5EF4-FFF2-40B4-BE49-F238E27FC236}">
-                <a16:creationId xmlns:a16="http://schemas.microsoft.com/office/drawing/2014/main" id="{F1981CDF-072B-C56C-C576-A1A69D57EA40}"/>
+      </p:cxnSp>
+      <p:sp>
+        <p:nvSpPr>
+          <p:cNvPr id="28" name="TextBox 27">
+            <a:extLst>
+              <a:ext uri="{FF2B5EF4-FFF2-40B4-BE49-F238E27FC236}">
+                <a16:creationId xmlns:a16="http://schemas.microsoft.com/office/drawing/2014/main" id="{C08B0663-9991-A389-5792-21F98360E9CB}"/>
               </a:ext>
             </a:extLst>
           </p:cNvPr>
@@ -5430,13 +5629,18 @@
         </p:nvSpPr>
         <p:spPr>
           <a:xfrm>
-            <a:off x="304798" y="4913147"/>
-            <a:ext cx="11451771" cy="369332"/>
+            <a:off x="8578921" y="5568440"/>
+            <a:ext cx="3452117" cy="523220"/>
           </a:xfrm>
           <a:prstGeom prst="rect">
             <a:avLst/>
           </a:prstGeom>
           <a:noFill/>
+          <a:ln>
+            <a:solidFill>
+              <a:schemeClr val="accent1"/>
+            </a:solidFill>
+          </a:ln>
         </p:spPr>
         <p:txBody>
           <a:bodyPr wrap="square" rtlCol="0">
@@ -5444,54 +5648,217 @@
           </a:bodyPr>
           <a:lstStyle/>
           <a:p>
-            <a:pPr marL="342900" indent="-342900">
-              <a:buFont typeface="Arial" panose="020B0604020202020204" pitchFamily="34" charset="0"/>
-              <a:buChar char="•"/>
-            </a:pPr>
-            <a:r>
-              <a:rPr lang="en-CH" dirty="0">
-                <a:latin typeface="Arial" panose="020B0604020202020204" pitchFamily="34" charset="0"/>
-                <a:cs typeface="Arial" panose="020B0604020202020204" pitchFamily="34" charset="0"/>
-              </a:rPr>
-              <a:t>Überprüfen, dass die Grösse des venv Ordners relativ gross ist: </a:t>
-            </a:r>
-          </a:p>
-        </p:txBody>
-      </p:sp>
-      <p:pic>
-        <p:nvPicPr>
-          <p:cNvPr id="15" name="Picture 14">
-            <a:extLst>
-              <a:ext uri="{FF2B5EF4-FFF2-40B4-BE49-F238E27FC236}">
-                <a16:creationId xmlns:a16="http://schemas.microsoft.com/office/drawing/2014/main" id="{4F7FE658-1D85-8354-0A67-E401CD7E48F4}"/>
-              </a:ext>
-            </a:extLst>
-          </p:cNvPr>
-          <p:cNvPicPr>
-            <a:picLocks noChangeAspect="1"/>
-          </p:cNvPicPr>
+            <a:r>
+              <a:rPr lang="en-CH" sz="1400" dirty="0">
+                <a:latin typeface="Arial" panose="020B0604020202020204" pitchFamily="34" charset="0"/>
+                <a:cs typeface="Arial" panose="020B0604020202020204" pitchFamily="34" charset="0"/>
+              </a:rPr>
+              <a:t>use </a:t>
+            </a:r>
+            <a:r>
+              <a:rPr lang="en-GB" sz="1400" b="1" i="1" dirty="0">
+                <a:latin typeface="Arial" panose="020B0604020202020204" pitchFamily="34" charset="0"/>
+                <a:cs typeface="Arial" panose="020B0604020202020204" pitchFamily="34" charset="0"/>
+              </a:rPr>
+              <a:t>./</a:t>
+            </a:r>
+            <a:r>
+              <a:rPr lang="en-GB" sz="1400" b="1" i="1" dirty="0" err="1">
+                <a:latin typeface="Arial" panose="020B0604020202020204" pitchFamily="34" charset="0"/>
+                <a:cs typeface="Arial" panose="020B0604020202020204" pitchFamily="34" charset="0"/>
+              </a:rPr>
+              <a:t>venv</a:t>
+            </a:r>
+            <a:r>
+              <a:rPr lang="en-GB" sz="1400" b="1" i="1" dirty="0">
+                <a:latin typeface="Arial" panose="020B0604020202020204" pitchFamily="34" charset="0"/>
+                <a:cs typeface="Arial" panose="020B0604020202020204" pitchFamily="34" charset="0"/>
+              </a:rPr>
+              <a:t>/bin/pip install --upgrade pip</a:t>
+            </a:r>
+            <a:r>
+              <a:rPr lang="en-CH" sz="1400" dirty="0">
+                <a:latin typeface="Arial" panose="020B0604020202020204" pitchFamily="34" charset="0"/>
+                <a:cs typeface="Arial" panose="020B0604020202020204" pitchFamily="34" charset="0"/>
+              </a:rPr>
+              <a:t> to ensure latest pip version!</a:t>
+            </a:r>
+            <a:endParaRPr lang="en-GB" sz="1400" dirty="0">
+              <a:latin typeface="Arial" panose="020B0604020202020204" pitchFamily="34" charset="0"/>
+              <a:cs typeface="Arial" panose="020B0604020202020204" pitchFamily="34" charset="0"/>
+            </a:endParaRPr>
+          </a:p>
+        </p:txBody>
+      </p:sp>
+      <p:cxnSp>
+        <p:nvCxnSpPr>
+          <p:cNvPr id="2" name="Straight Arrow Connector 1">
+            <a:extLst>
+              <a:ext uri="{FF2B5EF4-FFF2-40B4-BE49-F238E27FC236}">
+                <a16:creationId xmlns:a16="http://schemas.microsoft.com/office/drawing/2014/main" id="{C2176802-C5EC-CED5-34BA-2639722014BE}"/>
+              </a:ext>
+            </a:extLst>
+          </p:cNvPr>
+          <p:cNvCxnSpPr>
+            <a:cxnSpLocks/>
+          </p:cNvCxnSpPr>
           <p:nvPr/>
-        </p:nvPicPr>
-        <p:blipFill>
-          <a:blip r:embed="rId3"/>
-          <a:stretch>
-            <a:fillRect/>
-          </a:stretch>
-        </p:blipFill>
-        <p:spPr>
-          <a:xfrm>
-            <a:off x="765764" y="5348739"/>
-            <a:ext cx="2596230" cy="1339692"/>
+        </p:nvCxnSpPr>
+        <p:spPr>
+          <a:xfrm>
+            <a:off x="5447015" y="6686611"/>
+            <a:ext cx="648985" cy="0"/>
+          </a:xfrm>
+          <a:prstGeom prst="straightConnector1">
+            <a:avLst/>
+          </a:prstGeom>
+          <a:ln w="19050">
+            <a:tailEnd type="triangle"/>
+          </a:ln>
+        </p:spPr>
+        <p:style>
+          <a:lnRef idx="1">
+            <a:schemeClr val="accent1"/>
+          </a:lnRef>
+          <a:fillRef idx="0">
+            <a:schemeClr val="accent1"/>
+          </a:fillRef>
+          <a:effectRef idx="0">
+            <a:schemeClr val="accent1"/>
+          </a:effectRef>
+          <a:fontRef idx="minor">
+            <a:schemeClr val="tx1"/>
+          </a:fontRef>
+        </p:style>
+      </p:cxnSp>
+      <p:sp>
+        <p:nvSpPr>
+          <p:cNvPr id="7" name="TextBox 6">
+            <a:extLst>
+              <a:ext uri="{FF2B5EF4-FFF2-40B4-BE49-F238E27FC236}">
+                <a16:creationId xmlns:a16="http://schemas.microsoft.com/office/drawing/2014/main" id="{0F598E3B-2CD7-57C9-3CD2-7310B29093D1}"/>
+              </a:ext>
+            </a:extLst>
+          </p:cNvPr>
+          <p:cNvSpPr txBox="1"/>
+          <p:nvPr/>
+        </p:nvSpPr>
+        <p:spPr>
+          <a:xfrm>
+            <a:off x="1994898" y="6150214"/>
+            <a:ext cx="3452117" cy="523220"/>
           </a:xfrm>
           <a:prstGeom prst="rect">
             <a:avLst/>
           </a:prstGeom>
-        </p:spPr>
-      </p:pic>
+          <a:noFill/>
+          <a:ln>
+            <a:solidFill>
+              <a:schemeClr val="accent1"/>
+            </a:solidFill>
+          </a:ln>
+        </p:spPr>
+        <p:txBody>
+          <a:bodyPr wrap="square" rtlCol="0">
+            <a:spAutoFit/>
+          </a:bodyPr>
+          <a:lstStyle/>
+          <a:p>
+            <a:r>
+              <a:rPr lang="de-CH" sz="1400" dirty="0" err="1">
+                <a:latin typeface="Arial" panose="020B0604020202020204" pitchFamily="34" charset="0"/>
+                <a:cs typeface="Arial" panose="020B0604020202020204" pitchFamily="34" charset="0"/>
+              </a:rPr>
+              <a:t>Necessary</a:t>
+            </a:r>
+            <a:r>
+              <a:rPr lang="de-CH" sz="1400" dirty="0">
+                <a:latin typeface="Arial" panose="020B0604020202020204" pitchFamily="34" charset="0"/>
+                <a:cs typeface="Arial" panose="020B0604020202020204" pitchFamily="34" charset="0"/>
+              </a:rPr>
+              <a:t> </a:t>
+            </a:r>
+            <a:r>
+              <a:rPr lang="de-CH" sz="1400" dirty="0" err="1">
+                <a:latin typeface="Arial" panose="020B0604020202020204" pitchFamily="34" charset="0"/>
+                <a:cs typeface="Arial" panose="020B0604020202020204" pitchFamily="34" charset="0"/>
+              </a:rPr>
+              <a:t>for</a:t>
+            </a:r>
+            <a:r>
+              <a:rPr lang="de-CH" sz="1400" dirty="0">
+                <a:latin typeface="Arial" panose="020B0604020202020204" pitchFamily="34" charset="0"/>
+                <a:cs typeface="Arial" panose="020B0604020202020204" pitchFamily="34" charset="0"/>
+              </a:rPr>
+              <a:t> </a:t>
+            </a:r>
+            <a:r>
+              <a:rPr lang="de-CH" sz="1400" dirty="0" err="1">
+                <a:latin typeface="Arial" panose="020B0604020202020204" pitchFamily="34" charset="0"/>
+                <a:cs typeface="Arial" panose="020B0604020202020204" pitchFamily="34" charset="0"/>
+              </a:rPr>
+              <a:t>part</a:t>
+            </a:r>
+            <a:r>
+              <a:rPr lang="de-CH" sz="1400" dirty="0">
+                <a:latin typeface="Arial" panose="020B0604020202020204" pitchFamily="34" charset="0"/>
+                <a:cs typeface="Arial" panose="020B0604020202020204" pitchFamily="34" charset="0"/>
+              </a:rPr>
+              <a:t> 2 (</a:t>
+            </a:r>
+            <a:r>
+              <a:rPr lang="de-CH" sz="1400" dirty="0" err="1">
+                <a:latin typeface="Arial" panose="020B0604020202020204" pitchFamily="34" charset="0"/>
+                <a:cs typeface="Arial" panose="020B0604020202020204" pitchFamily="34" charset="0"/>
+              </a:rPr>
+              <a:t>comparison</a:t>
+            </a:r>
+            <a:r>
+              <a:rPr lang="de-CH" sz="1400" dirty="0">
+                <a:latin typeface="Arial" panose="020B0604020202020204" pitchFamily="34" charset="0"/>
+                <a:cs typeface="Arial" panose="020B0604020202020204" pitchFamily="34" charset="0"/>
+              </a:rPr>
+              <a:t> </a:t>
+            </a:r>
+            <a:r>
+              <a:rPr lang="de-CH" sz="1400" dirty="0" err="1">
+                <a:latin typeface="Arial" panose="020B0604020202020204" pitchFamily="34" charset="0"/>
+                <a:cs typeface="Arial" panose="020B0604020202020204" pitchFamily="34" charset="0"/>
+              </a:rPr>
+              <a:t>with</a:t>
+            </a:r>
+            <a:r>
+              <a:rPr lang="de-CH" sz="1400" dirty="0">
+                <a:latin typeface="Arial" panose="020B0604020202020204" pitchFamily="34" charset="0"/>
+                <a:cs typeface="Arial" panose="020B0604020202020204" pitchFamily="34" charset="0"/>
+              </a:rPr>
+              <a:t> </a:t>
+            </a:r>
+            <a:r>
+              <a:rPr lang="de-CH" sz="1400" dirty="0" err="1">
+                <a:latin typeface="Arial" panose="020B0604020202020204" pitchFamily="34" charset="0"/>
+                <a:cs typeface="Arial" panose="020B0604020202020204" pitchFamily="34" charset="0"/>
+              </a:rPr>
+              <a:t>PySolar</a:t>
+            </a:r>
+            <a:r>
+              <a:rPr lang="de-CH" sz="1400" dirty="0">
+                <a:latin typeface="Arial" panose="020B0604020202020204" pitchFamily="34" charset="0"/>
+                <a:cs typeface="Arial" panose="020B0604020202020204" pitchFamily="34" charset="0"/>
+              </a:rPr>
+              <a:t>)</a:t>
+            </a:r>
+            <a:endParaRPr lang="en-GB" sz="1400" dirty="0">
+              <a:latin typeface="Arial" panose="020B0604020202020204" pitchFamily="34" charset="0"/>
+              <a:cs typeface="Arial" panose="020B0604020202020204" pitchFamily="34" charset="0"/>
+            </a:endParaRPr>
+          </a:p>
+        </p:txBody>
+      </p:sp>
     </p:spTree>
     <p:extLst>
       <p:ext uri="{BB962C8B-B14F-4D97-AF65-F5344CB8AC3E}">
-        <p14:creationId xmlns:p14="http://schemas.microsoft.com/office/powerpoint/2010/main" val="44288444"/>
+        <p14:creationId xmlns:p14="http://schemas.microsoft.com/office/powerpoint/2010/main" val="3061928575"/>
       </p:ext>
     </p:extLst>
   </p:cSld>
@@ -5520,10 +5887,10 @@
       </p:grpSpPr>
       <p:sp>
         <p:nvSpPr>
-          <p:cNvPr id="4" name="TextBox 3">
-            <a:extLst>
-              <a:ext uri="{FF2B5EF4-FFF2-40B4-BE49-F238E27FC236}">
-                <a16:creationId xmlns:a16="http://schemas.microsoft.com/office/drawing/2014/main" id="{F6C99D8C-3ACF-F066-E630-6DDBD48A7B01}"/>
+          <p:cNvPr id="27" name="TextBox 26">
+            <a:extLst>
+              <a:ext uri="{FF2B5EF4-FFF2-40B4-BE49-F238E27FC236}">
+                <a16:creationId xmlns:a16="http://schemas.microsoft.com/office/drawing/2014/main" id="{1638E0EB-741B-2F11-5E0B-2D0DDEB0CCF2}"/>
               </a:ext>
             </a:extLst>
           </p:cNvPr>
@@ -5532,8 +5899,351 @@
         </p:nvSpPr>
         <p:spPr>
           <a:xfrm>
-            <a:off x="370114" y="2767280"/>
-            <a:ext cx="11451771" cy="1323439"/>
+            <a:off x="304799" y="169569"/>
+            <a:ext cx="11451771" cy="646331"/>
+          </a:xfrm>
+          <a:prstGeom prst="rect">
+            <a:avLst/>
+          </a:prstGeom>
+          <a:noFill/>
+        </p:spPr>
+        <p:txBody>
+          <a:bodyPr wrap="square" rtlCol="0">
+            <a:spAutoFit/>
+          </a:bodyPr>
+          <a:lstStyle/>
+          <a:p>
+            <a:pPr marL="342900" indent="-342900">
+              <a:buFont typeface="Arial" panose="020B0604020202020204" pitchFamily="34" charset="0"/>
+              <a:buChar char="•"/>
+            </a:pPr>
+            <a:r>
+              <a:rPr lang="en-CH" dirty="0">
+                <a:latin typeface="Arial" panose="020B0604020202020204" pitchFamily="34" charset="0"/>
+                <a:cs typeface="Arial" panose="020B0604020202020204" pitchFamily="34" charset="0"/>
+              </a:rPr>
+              <a:t>Überprüfen, dass alle packages in die virtuelle Umgebung installiert und vorhanden sind:</a:t>
+            </a:r>
+            <a:br>
+              <a:rPr lang="en-CH" dirty="0">
+                <a:latin typeface="Arial" panose="020B0604020202020204" pitchFamily="34" charset="0"/>
+                <a:cs typeface="Arial" panose="020B0604020202020204" pitchFamily="34" charset="0"/>
+              </a:rPr>
+            </a:br>
+            <a:r>
+              <a:rPr lang="en-CH" dirty="0">
+                <a:latin typeface="Arial" panose="020B0604020202020204" pitchFamily="34" charset="0"/>
+                <a:cs typeface="Arial" panose="020B0604020202020204" pitchFamily="34" charset="0"/>
+              </a:rPr>
+              <a:t>PyCharm &lt; Eistellungen &lt; Python Interpreter</a:t>
+            </a:r>
+          </a:p>
+        </p:txBody>
+      </p:sp>
+      <p:pic>
+        <p:nvPicPr>
+          <p:cNvPr id="5" name="Picture 4">
+            <a:extLst>
+              <a:ext uri="{FF2B5EF4-FFF2-40B4-BE49-F238E27FC236}">
+                <a16:creationId xmlns:a16="http://schemas.microsoft.com/office/drawing/2014/main" id="{CB1DC553-33D4-FE8F-E6B7-77F50E1A55F4}"/>
+              </a:ext>
+            </a:extLst>
+          </p:cNvPr>
+          <p:cNvPicPr>
+            <a:picLocks noChangeAspect="1"/>
+          </p:cNvPicPr>
+          <p:nvPr/>
+        </p:nvPicPr>
+        <p:blipFill>
+          <a:blip r:embed="rId2"/>
+          <a:stretch>
+            <a:fillRect/>
+          </a:stretch>
+        </p:blipFill>
+        <p:spPr>
+          <a:xfrm>
+            <a:off x="765764" y="965770"/>
+            <a:ext cx="5624762" cy="3756029"/>
+          </a:xfrm>
+          <a:prstGeom prst="rect">
+            <a:avLst/>
+          </a:prstGeom>
+        </p:spPr>
+      </p:pic>
+      <p:sp>
+        <p:nvSpPr>
+          <p:cNvPr id="7" name="Oval 6">
+            <a:extLst>
+              <a:ext uri="{FF2B5EF4-FFF2-40B4-BE49-F238E27FC236}">
+                <a16:creationId xmlns:a16="http://schemas.microsoft.com/office/drawing/2014/main" id="{8A8984FF-C8D2-C9A2-6866-E372E157E5EE}"/>
+              </a:ext>
+            </a:extLst>
+          </p:cNvPr>
+          <p:cNvSpPr/>
+          <p:nvPr/>
+        </p:nvSpPr>
+        <p:spPr>
+          <a:xfrm>
+            <a:off x="765764" y="774783"/>
+            <a:ext cx="1345914" cy="541229"/>
+          </a:xfrm>
+          <a:prstGeom prst="ellipse">
+            <a:avLst/>
+          </a:prstGeom>
+          <a:noFill/>
+          <a:ln w="38100">
+            <a:solidFill>
+              <a:srgbClr val="FF0000"/>
+            </a:solidFill>
+          </a:ln>
+        </p:spPr>
+        <p:style>
+          <a:lnRef idx="2">
+            <a:schemeClr val="accent1">
+              <a:shade val="15000"/>
+            </a:schemeClr>
+          </a:lnRef>
+          <a:fillRef idx="1">
+            <a:schemeClr val="accent1"/>
+          </a:fillRef>
+          <a:effectRef idx="0">
+            <a:schemeClr val="accent1"/>
+          </a:effectRef>
+          <a:fontRef idx="minor">
+            <a:schemeClr val="lt1"/>
+          </a:fontRef>
+        </p:style>
+        <p:txBody>
+          <a:bodyPr rtlCol="0" anchor="ctr"/>
+          <a:lstStyle/>
+          <a:p>
+            <a:pPr algn="ctr"/>
+            <a:endParaRPr lang="en-CH"/>
+          </a:p>
+        </p:txBody>
+      </p:sp>
+      <p:sp>
+        <p:nvSpPr>
+          <p:cNvPr id="8" name="Oval 7">
+            <a:extLst>
+              <a:ext uri="{FF2B5EF4-FFF2-40B4-BE49-F238E27FC236}">
+                <a16:creationId xmlns:a16="http://schemas.microsoft.com/office/drawing/2014/main" id="{F61BE801-033E-7761-1E9D-85CFA2CCD26D}"/>
+              </a:ext>
+            </a:extLst>
+          </p:cNvPr>
+          <p:cNvSpPr/>
+          <p:nvPr/>
+        </p:nvSpPr>
+        <p:spPr>
+          <a:xfrm>
+            <a:off x="2111678" y="1150499"/>
+            <a:ext cx="1345914" cy="541229"/>
+          </a:xfrm>
+          <a:prstGeom prst="ellipse">
+            <a:avLst/>
+          </a:prstGeom>
+          <a:noFill/>
+          <a:ln w="38100">
+            <a:solidFill>
+              <a:srgbClr val="FF0000"/>
+            </a:solidFill>
+          </a:ln>
+        </p:spPr>
+        <p:style>
+          <a:lnRef idx="2">
+            <a:schemeClr val="accent1">
+              <a:shade val="15000"/>
+            </a:schemeClr>
+          </a:lnRef>
+          <a:fillRef idx="1">
+            <a:schemeClr val="accent1"/>
+          </a:fillRef>
+          <a:effectRef idx="0">
+            <a:schemeClr val="accent1"/>
+          </a:effectRef>
+          <a:fontRef idx="minor">
+            <a:schemeClr val="lt1"/>
+          </a:fontRef>
+        </p:style>
+        <p:txBody>
+          <a:bodyPr rtlCol="0" anchor="ctr"/>
+          <a:lstStyle/>
+          <a:p>
+            <a:pPr algn="ctr"/>
+            <a:endParaRPr lang="en-CH"/>
+          </a:p>
+        </p:txBody>
+      </p:sp>
+      <p:sp>
+        <p:nvSpPr>
+          <p:cNvPr id="10" name="Oval 9">
+            <a:extLst>
+              <a:ext uri="{FF2B5EF4-FFF2-40B4-BE49-F238E27FC236}">
+                <a16:creationId xmlns:a16="http://schemas.microsoft.com/office/drawing/2014/main" id="{986221C9-A6F6-C067-DA5D-823F1D4A4087}"/>
+              </a:ext>
+            </a:extLst>
+          </p:cNvPr>
+          <p:cNvSpPr/>
+          <p:nvPr/>
+        </p:nvSpPr>
+        <p:spPr>
+          <a:xfrm>
+            <a:off x="635284" y="4510355"/>
+            <a:ext cx="751727" cy="253456"/>
+          </a:xfrm>
+          <a:prstGeom prst="ellipse">
+            <a:avLst/>
+          </a:prstGeom>
+          <a:noFill/>
+          <a:ln w="38100">
+            <a:solidFill>
+              <a:srgbClr val="FF0000"/>
+            </a:solidFill>
+          </a:ln>
+        </p:spPr>
+        <p:style>
+          <a:lnRef idx="2">
+            <a:schemeClr val="accent1">
+              <a:shade val="15000"/>
+            </a:schemeClr>
+          </a:lnRef>
+          <a:fillRef idx="1">
+            <a:schemeClr val="accent1"/>
+          </a:fillRef>
+          <a:effectRef idx="0">
+            <a:schemeClr val="accent1"/>
+          </a:effectRef>
+          <a:fontRef idx="minor">
+            <a:schemeClr val="lt1"/>
+          </a:fontRef>
+        </p:style>
+        <p:txBody>
+          <a:bodyPr rtlCol="0" anchor="ctr"/>
+          <a:lstStyle/>
+          <a:p>
+            <a:pPr algn="ctr"/>
+            <a:endParaRPr lang="en-CH"/>
+          </a:p>
+        </p:txBody>
+      </p:sp>
+      <p:sp>
+        <p:nvSpPr>
+          <p:cNvPr id="11" name="TextBox 10">
+            <a:extLst>
+              <a:ext uri="{FF2B5EF4-FFF2-40B4-BE49-F238E27FC236}">
+                <a16:creationId xmlns:a16="http://schemas.microsoft.com/office/drawing/2014/main" id="{F1981CDF-072B-C56C-C576-A1A69D57EA40}"/>
+              </a:ext>
+            </a:extLst>
+          </p:cNvPr>
+          <p:cNvSpPr txBox="1"/>
+          <p:nvPr/>
+        </p:nvSpPr>
+        <p:spPr>
+          <a:xfrm>
+            <a:off x="304798" y="4913147"/>
+            <a:ext cx="11451771" cy="369332"/>
+          </a:xfrm>
+          <a:prstGeom prst="rect">
+            <a:avLst/>
+          </a:prstGeom>
+          <a:noFill/>
+        </p:spPr>
+        <p:txBody>
+          <a:bodyPr wrap="square" rtlCol="0">
+            <a:spAutoFit/>
+          </a:bodyPr>
+          <a:lstStyle/>
+          <a:p>
+            <a:pPr marL="342900" indent="-342900">
+              <a:buFont typeface="Arial" panose="020B0604020202020204" pitchFamily="34" charset="0"/>
+              <a:buChar char="•"/>
+            </a:pPr>
+            <a:r>
+              <a:rPr lang="en-CH" dirty="0">
+                <a:latin typeface="Arial" panose="020B0604020202020204" pitchFamily="34" charset="0"/>
+                <a:cs typeface="Arial" panose="020B0604020202020204" pitchFamily="34" charset="0"/>
+              </a:rPr>
+              <a:t>Überprüfen, dass die Grösse des venv Ordners relativ gross ist: </a:t>
+            </a:r>
+          </a:p>
+        </p:txBody>
+      </p:sp>
+      <p:pic>
+        <p:nvPicPr>
+          <p:cNvPr id="15" name="Picture 14">
+            <a:extLst>
+              <a:ext uri="{FF2B5EF4-FFF2-40B4-BE49-F238E27FC236}">
+                <a16:creationId xmlns:a16="http://schemas.microsoft.com/office/drawing/2014/main" id="{4F7FE658-1D85-8354-0A67-E401CD7E48F4}"/>
+              </a:ext>
+            </a:extLst>
+          </p:cNvPr>
+          <p:cNvPicPr>
+            <a:picLocks noChangeAspect="1"/>
+          </p:cNvPicPr>
+          <p:nvPr/>
+        </p:nvPicPr>
+        <p:blipFill>
+          <a:blip r:embed="rId3"/>
+          <a:stretch>
+            <a:fillRect/>
+          </a:stretch>
+        </p:blipFill>
+        <p:spPr>
+          <a:xfrm>
+            <a:off x="765764" y="5348739"/>
+            <a:ext cx="2596230" cy="1339692"/>
+          </a:xfrm>
+          <a:prstGeom prst="rect">
+            <a:avLst/>
+          </a:prstGeom>
+        </p:spPr>
+      </p:pic>
+    </p:spTree>
+    <p:extLst>
+      <p:ext uri="{BB962C8B-B14F-4D97-AF65-F5344CB8AC3E}">
+        <p14:creationId xmlns:p14="http://schemas.microsoft.com/office/powerpoint/2010/main" val="44288444"/>
+      </p:ext>
+    </p:extLst>
+  </p:cSld>
+  <p:clrMapOvr>
+    <a:masterClrMapping/>
+  </p:clrMapOvr>
+</p:sld>
+</file>
+
+<file path=ppt/slides/slide8.xml><?xml version="1.0" encoding="utf-8"?>
+<p:sld xmlns:a="http://schemas.openxmlformats.org/drawingml/2006/main" xmlns:r="http://schemas.openxmlformats.org/officeDocument/2006/relationships" xmlns:p="http://schemas.openxmlformats.org/presentationml/2006/main">
+  <p:cSld>
+    <p:spTree>
+      <p:nvGrpSpPr>
+        <p:cNvPr id="1" name=""/>
+        <p:cNvGrpSpPr/>
+        <p:nvPr/>
+      </p:nvGrpSpPr>
+      <p:grpSpPr>
+        <a:xfrm>
+          <a:off x="0" y="0"/>
+          <a:ext cx="0" cy="0"/>
+          <a:chOff x="0" y="0"/>
+          <a:chExt cx="0" cy="0"/>
+        </a:xfrm>
+      </p:grpSpPr>
+      <p:sp>
+        <p:nvSpPr>
+          <p:cNvPr id="2" name="TextBox 1">
+            <a:extLst>
+              <a:ext uri="{FF2B5EF4-FFF2-40B4-BE49-F238E27FC236}">
+                <a16:creationId xmlns:a16="http://schemas.microsoft.com/office/drawing/2014/main" id="{9D66A091-B91C-51FD-6B4E-E6A017FA7BBA}"/>
+              </a:ext>
+            </a:extLst>
+          </p:cNvPr>
+          <p:cNvSpPr txBox="1"/>
+          <p:nvPr/>
+        </p:nvSpPr>
+        <p:spPr>
+          <a:xfrm>
+            <a:off x="370110" y="2607655"/>
+            <a:ext cx="11451771" cy="2000548"/>
           </a:xfrm>
           <a:prstGeom prst="rect">
             <a:avLst/>
@@ -5553,7 +6263,24 @@
           <a:p>
             <a:pPr algn="ctr"/>
             <a:r>
-              <a:rPr lang="en-CH" sz="4000" dirty="0">
+              <a:rPr lang="en-CH" sz="3000" b="1" dirty="0">
+                <a:latin typeface="Arial" panose="020B0604020202020204" pitchFamily="34" charset="0"/>
+                <a:cs typeface="Arial" panose="020B0604020202020204" pitchFamily="34" charset="0"/>
+              </a:rPr>
+              <a:t>[2]</a:t>
+            </a:r>
+          </a:p>
+          <a:p>
+            <a:pPr algn="ctr"/>
+            <a:endParaRPr lang="en-CH" sz="3000" b="1" dirty="0">
+              <a:latin typeface="Arial" panose="020B0604020202020204" pitchFamily="34" charset="0"/>
+              <a:cs typeface="Arial" panose="020B0604020202020204" pitchFamily="34" charset="0"/>
+            </a:endParaRPr>
+          </a:p>
+          <a:p>
+            <a:pPr algn="ctr"/>
+            <a:r>
+              <a:rPr lang="en-CH" sz="3200" dirty="0">
                 <a:latin typeface="Arial" panose="020B0604020202020204" pitchFamily="34" charset="0"/>
                 <a:cs typeface="Arial" panose="020B0604020202020204" pitchFamily="34" charset="0"/>
               </a:rPr>
@@ -5563,11 +6290,92 @@
           <a:p>
             <a:pPr algn="ctr"/>
             <a:r>
-              <a:rPr lang="en-CH" sz="4000" dirty="0">
+              <a:rPr lang="en-CH" sz="3200" dirty="0">
                 <a:latin typeface="Arial" panose="020B0604020202020204" pitchFamily="34" charset="0"/>
                 <a:cs typeface="Arial" panose="020B0604020202020204" pitchFamily="34" charset="0"/>
               </a:rPr>
               <a:t> virtual environment</a:t>
+            </a:r>
+          </a:p>
+        </p:txBody>
+      </p:sp>
+      <p:sp>
+        <p:nvSpPr>
+          <p:cNvPr id="3" name="TextBox 2">
+            <a:extLst>
+              <a:ext uri="{FF2B5EF4-FFF2-40B4-BE49-F238E27FC236}">
+                <a16:creationId xmlns:a16="http://schemas.microsoft.com/office/drawing/2014/main" id="{771DEB4A-B95F-8F1E-FBBF-8C69A484B6CC}"/>
+              </a:ext>
+            </a:extLst>
+          </p:cNvPr>
+          <p:cNvSpPr txBox="1"/>
+          <p:nvPr/>
+        </p:nvSpPr>
+        <p:spPr>
+          <a:xfrm>
+            <a:off x="370111" y="258673"/>
+            <a:ext cx="11451771" cy="1246495"/>
+          </a:xfrm>
+          <a:prstGeom prst="rect">
+            <a:avLst/>
+          </a:prstGeom>
+          <a:solidFill>
+            <a:schemeClr val="accent6">
+              <a:lumMod val="40000"/>
+              <a:lumOff val="60000"/>
+            </a:schemeClr>
+          </a:solidFill>
+        </p:spPr>
+        <p:txBody>
+          <a:bodyPr wrap="square" rtlCol="0">
+            <a:spAutoFit/>
+          </a:bodyPr>
+          <a:lstStyle/>
+          <a:p>
+            <a:pPr algn="ctr"/>
+            <a:r>
+              <a:rPr lang="en-CH" sz="2500" u="sng" dirty="0">
+                <a:latin typeface="Arial" panose="020B0604020202020204" pitchFamily="34" charset="0"/>
+                <a:cs typeface="Arial" panose="020B0604020202020204" pitchFamily="34" charset="0"/>
+              </a:rPr>
+              <a:t>Preparation steps for</a:t>
+            </a:r>
+            <a:r>
+              <a:rPr lang="en-CH" sz="2500" dirty="0">
+                <a:latin typeface="Arial" panose="020B0604020202020204" pitchFamily="34" charset="0"/>
+                <a:cs typeface="Arial" panose="020B0604020202020204" pitchFamily="34" charset="0"/>
+              </a:rPr>
+              <a:t>:</a:t>
+            </a:r>
+          </a:p>
+          <a:p>
+            <a:pPr algn="ctr"/>
+            <a:endParaRPr lang="en-CH" sz="2500" dirty="0">
+              <a:latin typeface="Arial" panose="020B0604020202020204" pitchFamily="34" charset="0"/>
+              <a:cs typeface="Arial" panose="020B0604020202020204" pitchFamily="34" charset="0"/>
+            </a:endParaRPr>
+          </a:p>
+          <a:p>
+            <a:r>
+              <a:rPr lang="en-CH" sz="2500" dirty="0">
+                <a:latin typeface="Arial" panose="020B0604020202020204" pitchFamily="34" charset="0"/>
+                <a:cs typeface="Arial" panose="020B0604020202020204" pitchFamily="34" charset="0"/>
+              </a:rPr>
+              <a:t>- Part 1: Custom Inf. </a:t>
+            </a:r>
+            <a:r>
+              <a:rPr lang="en-GB" sz="2500" dirty="0">
+                <a:latin typeface="Arial" panose="020B0604020202020204" pitchFamily="34" charset="0"/>
+                <a:cs typeface="Arial" panose="020B0604020202020204" pitchFamily="34" charset="0"/>
+              </a:rPr>
+              <a:t>R</a:t>
+            </a:r>
+            <a:r>
+              <a:rPr lang="en-CH" sz="2500" dirty="0">
+                <a:latin typeface="Arial" panose="020B0604020202020204" pitchFamily="34" charset="0"/>
+                <a:cs typeface="Arial" panose="020B0604020202020204" pitchFamily="34" charset="0"/>
+              </a:rPr>
+              <a:t>etrieval System (CINF)</a:t>
             </a:r>
           </a:p>
         </p:txBody>
@@ -5585,7 +6393,7 @@
 </p:sld>
 </file>
 
-<file path=ppt/slides/slide8.xml><?xml version="1.0" encoding="utf-8"?>
+<file path=ppt/slides/slide9.xml><?xml version="1.0" encoding="utf-8"?>
 <p:sld xmlns:a="http://schemas.openxmlformats.org/drawingml/2006/main" xmlns:r="http://schemas.openxmlformats.org/officeDocument/2006/relationships" xmlns:p="http://schemas.openxmlformats.org/presentationml/2006/main">
   <p:cSld>
     <p:spTree>
@@ -6494,106 +7302,6 @@
 </p:sld>
 </file>
 
-<file path=ppt/slides/slide9.xml><?xml version="1.0" encoding="utf-8"?>
-<p:sld xmlns:a="http://schemas.openxmlformats.org/drawingml/2006/main" xmlns:r="http://schemas.openxmlformats.org/officeDocument/2006/relationships" xmlns:p="http://schemas.openxmlformats.org/presentationml/2006/main">
-  <p:cSld>
-    <p:spTree>
-      <p:nvGrpSpPr>
-        <p:cNvPr id="1" name=""/>
-        <p:cNvGrpSpPr/>
-        <p:nvPr/>
-      </p:nvGrpSpPr>
-      <p:grpSpPr>
-        <a:xfrm>
-          <a:off x="0" y="0"/>
-          <a:ext cx="0" cy="0"/>
-          <a:chOff x="0" y="0"/>
-          <a:chExt cx="0" cy="0"/>
-        </a:xfrm>
-      </p:grpSpPr>
-      <p:sp>
-        <p:nvSpPr>
-          <p:cNvPr id="2" name="Title 1">
-            <a:extLst>
-              <a:ext uri="{FF2B5EF4-FFF2-40B4-BE49-F238E27FC236}">
-                <a16:creationId xmlns:a16="http://schemas.microsoft.com/office/drawing/2014/main" id="{D36E24B2-E52C-EA40-3031-07E8B2007BAD}"/>
-              </a:ext>
-            </a:extLst>
-          </p:cNvPr>
-          <p:cNvSpPr>
-            <a:spLocks noGrp="1"/>
-          </p:cNvSpPr>
-          <p:nvPr>
-            <p:ph type="title"/>
-          </p:nvPr>
-        </p:nvSpPr>
-        <p:spPr/>
-        <p:txBody>
-          <a:bodyPr/>
-          <a:lstStyle/>
-          <a:p>
-            <a:r>
-              <a:rPr lang="en-GB" dirty="0"/>
-              <a:t>spacy download </a:t>
-            </a:r>
-            <a:r>
-              <a:rPr lang="en-GB" dirty="0" err="1"/>
-              <a:t>en_core_web_sm</a:t>
-            </a:r>
-            <a:endParaRPr lang="en-CH" dirty="0"/>
-          </a:p>
-        </p:txBody>
-      </p:sp>
-      <p:sp>
-        <p:nvSpPr>
-          <p:cNvPr id="3" name="Content Placeholder 2">
-            <a:extLst>
-              <a:ext uri="{FF2B5EF4-FFF2-40B4-BE49-F238E27FC236}">
-                <a16:creationId xmlns:a16="http://schemas.microsoft.com/office/drawing/2014/main" id="{3A03E9B1-65FF-BF9E-E6A1-B1A2C018BE70}"/>
-              </a:ext>
-            </a:extLst>
-          </p:cNvPr>
-          <p:cNvSpPr>
-            <a:spLocks noGrp="1"/>
-          </p:cNvSpPr>
-          <p:nvPr>
-            <p:ph idx="1"/>
-          </p:nvPr>
-        </p:nvSpPr>
-        <p:spPr/>
-        <p:txBody>
-          <a:bodyPr/>
-          <a:lstStyle/>
-          <a:p>
-            <a:r>
-              <a:rPr lang="en-GB" dirty="0" err="1"/>
-              <a:t>nltk.downloader</a:t>
-            </a:r>
-            <a:r>
-              <a:rPr lang="en-GB" dirty="0"/>
-              <a:t> </a:t>
-            </a:r>
-            <a:r>
-              <a:rPr lang="en-GB" dirty="0" err="1"/>
-              <a:t>stopwords</a:t>
-            </a:r>
-            <a:endParaRPr lang="en-CH" dirty="0"/>
-          </a:p>
-        </p:txBody>
-      </p:sp>
-    </p:spTree>
-    <p:extLst>
-      <p:ext uri="{BB962C8B-B14F-4D97-AF65-F5344CB8AC3E}">
-        <p14:creationId xmlns:p14="http://schemas.microsoft.com/office/powerpoint/2010/main" val="2514017380"/>
-      </p:ext>
-    </p:extLst>
-  </p:cSld>
-  <p:clrMapOvr>
-    <a:masterClrMapping/>
-  </p:clrMapOvr>
-</p:sld>
-</file>
-
 <file path=ppt/theme/theme1.xml><?xml version="1.0" encoding="utf-8"?>
 <a:theme xmlns:a="http://schemas.openxmlformats.org/drawingml/2006/main" name="Office Theme">
   <a:themeElements>

</xml_diff>